<commit_message>
ppt updaet 31-jan & loops
</commit_message>
<xml_diff>
--- a/JAVA.pptx
+++ b/JAVA.pptx
@@ -5,10 +5,10 @@
     <p:sldMasterId id="2147483744" r:id="rId1"/>
   </p:sldMasterIdLst>
   <p:notesMasterIdLst>
-    <p:notesMasterId r:id="rId55"/>
+    <p:notesMasterId r:id="rId69"/>
   </p:notesMasterIdLst>
   <p:handoutMasterIdLst>
-    <p:handoutMasterId r:id="rId56"/>
+    <p:handoutMasterId r:id="rId70"/>
   </p:handoutMasterIdLst>
   <p:sldIdLst>
     <p:sldId id="256" r:id="rId2"/>
@@ -52,18 +52,32 @@
     <p:sldId id="313" r:id="rId40"/>
     <p:sldId id="314" r:id="rId41"/>
     <p:sldId id="317" r:id="rId42"/>
-    <p:sldId id="262" r:id="rId43"/>
-    <p:sldId id="258" r:id="rId44"/>
-    <p:sldId id="260" r:id="rId45"/>
-    <p:sldId id="261" r:id="rId46"/>
-    <p:sldId id="259" r:id="rId47"/>
-    <p:sldId id="263" r:id="rId48"/>
-    <p:sldId id="266" r:id="rId49"/>
-    <p:sldId id="267" r:id="rId50"/>
-    <p:sldId id="268" r:id="rId51"/>
-    <p:sldId id="269" r:id="rId52"/>
-    <p:sldId id="270" r:id="rId53"/>
-    <p:sldId id="271" r:id="rId54"/>
+    <p:sldId id="318" r:id="rId43"/>
+    <p:sldId id="319" r:id="rId44"/>
+    <p:sldId id="262" r:id="rId45"/>
+    <p:sldId id="258" r:id="rId46"/>
+    <p:sldId id="260" r:id="rId47"/>
+    <p:sldId id="261" r:id="rId48"/>
+    <p:sldId id="259" r:id="rId49"/>
+    <p:sldId id="263" r:id="rId50"/>
+    <p:sldId id="266" r:id="rId51"/>
+    <p:sldId id="267" r:id="rId52"/>
+    <p:sldId id="268" r:id="rId53"/>
+    <p:sldId id="269" r:id="rId54"/>
+    <p:sldId id="270" r:id="rId55"/>
+    <p:sldId id="271" r:id="rId56"/>
+    <p:sldId id="320" r:id="rId57"/>
+    <p:sldId id="321" r:id="rId58"/>
+    <p:sldId id="322" r:id="rId59"/>
+    <p:sldId id="323" r:id="rId60"/>
+    <p:sldId id="324" r:id="rId61"/>
+    <p:sldId id="325" r:id="rId62"/>
+    <p:sldId id="326" r:id="rId63"/>
+    <p:sldId id="327" r:id="rId64"/>
+    <p:sldId id="328" r:id="rId65"/>
+    <p:sldId id="329" r:id="rId66"/>
+    <p:sldId id="330" r:id="rId67"/>
+    <p:sldId id="331" r:id="rId68"/>
   </p:sldIdLst>
   <p:sldSz cx="12192000" cy="6858000"/>
   <p:notesSz cx="6858000" cy="9144000"/>
@@ -239,7 +253,17 @@
             <p14:sldId id="264"/>
             <p14:sldId id="313"/>
             <p14:sldId id="314"/>
+          </p14:sldIdLst>
+        </p14:section>
+        <p14:section name="method overloading" id="{0DF4CCF1-EFC9-AD4C-8AE8-92889303420C}">
+          <p14:sldIdLst>
             <p14:sldId id="317"/>
+          </p14:sldIdLst>
+        </p14:section>
+        <p14:section name="constructor" id="{E956E76C-D0C3-F547-82B3-5AF9F8F59ED3}">
+          <p14:sldIdLst>
+            <p14:sldId id="318"/>
+            <p14:sldId id="319"/>
           </p14:sldIdLst>
         </p14:section>
         <p14:section name="Inheritance" id="{8CADAE95-11EF-574A-95F7-8EE9A86821A6}">
@@ -249,6 +273,10 @@
             <p14:sldId id="260"/>
             <p14:sldId id="261"/>
             <p14:sldId id="259"/>
+          </p14:sldIdLst>
+        </p14:section>
+        <p14:section name="method overriding" id="{9F33CB89-60DB-6248-A42F-371B310BD09B}">
+          <p14:sldIdLst>
             <p14:sldId id="263"/>
             <p14:sldId id="266"/>
           </p14:sldIdLst>
@@ -260,6 +288,18 @@
             <p14:sldId id="269"/>
             <p14:sldId id="270"/>
             <p14:sldId id="271"/>
+            <p14:sldId id="320"/>
+            <p14:sldId id="321"/>
+            <p14:sldId id="322"/>
+            <p14:sldId id="323"/>
+            <p14:sldId id="324"/>
+            <p14:sldId id="325"/>
+            <p14:sldId id="326"/>
+            <p14:sldId id="327"/>
+            <p14:sldId id="328"/>
+            <p14:sldId id="329"/>
+            <p14:sldId id="330"/>
+            <p14:sldId id="331"/>
           </p14:sldIdLst>
         </p14:section>
       </p14:sectionLst>
@@ -376,7 +416,7 @@
           <a:p>
             <a:fld id="{5F93A93E-98D8-2E40-9923-E936BE611E4E}" type="datetimeFigureOut">
               <a:rPr lang="en-US" smtClean="0"/>
-              <a:t>1/26/26</a:t>
+              <a:t>1/31/26</a:t>
             </a:fld>
             <a:endParaRPr lang="en-US"/>
           </a:p>
@@ -554,7 +594,7 @@
           <a:p>
             <a:fld id="{2F7820E3-4170-A04A-9863-FAEB3C2C71C2}" type="datetimeFigureOut">
               <a:rPr lang="en-US" smtClean="0"/>
-              <a:t>1/26/26</a:t>
+              <a:t>1/31/26</a:t>
             </a:fld>
             <a:endParaRPr lang="en-US"/>
           </a:p>
@@ -1324,7 +1364,7 @@
           <a:p>
             <a:fld id="{5DA0476E-A797-5448-979D-118521238144}" type="datetime1">
               <a:rPr lang="en-IN" smtClean="0"/>
-              <a:t>26/01/26</a:t>
+              <a:t>31/01/26</a:t>
             </a:fld>
             <a:endParaRPr lang="en-US"/>
           </a:p>
@@ -1506,7 +1546,7 @@
           <a:p>
             <a:fld id="{A59108F0-9317-2349-9230-B740A0E6FF1C}" type="datetime1">
               <a:rPr lang="en-IN" smtClean="0"/>
-              <a:t>26/01/26</a:t>
+              <a:t>31/01/26</a:t>
             </a:fld>
             <a:endParaRPr lang="en-US"/>
           </a:p>
@@ -1689,7 +1729,7 @@
           <a:p>
             <a:fld id="{4C95B45A-5479-AD4C-A2CB-815163E461CA}" type="datetime1">
               <a:rPr lang="en-IN" smtClean="0"/>
-              <a:t>26/01/26</a:t>
+              <a:t>31/01/26</a:t>
             </a:fld>
             <a:endParaRPr lang="en-US"/>
           </a:p>
@@ -1862,7 +1902,7 @@
           <a:p>
             <a:fld id="{8E03706B-D909-9D4A-A176-1700ACF47983}" type="datetime1">
               <a:rPr lang="en-IN" smtClean="0"/>
-              <a:t>26/01/26</a:t>
+              <a:t>31/01/26</a:t>
             </a:fld>
             <a:endParaRPr lang="en-US"/>
           </a:p>
@@ -2186,7 +2226,7 @@
           <a:p>
             <a:fld id="{D1BD50BA-E8DE-084B-BA32-A9837CF2DE60}" type="datetime1">
               <a:rPr lang="en-IN" smtClean="0"/>
-              <a:t>26/01/26</a:t>
+              <a:t>31/01/26</a:t>
             </a:fld>
             <a:endParaRPr lang="en-US"/>
           </a:p>
@@ -2649,7 +2689,7 @@
           <a:p>
             <a:fld id="{970A85A6-BF03-7741-809D-65C12097F284}" type="datetime1">
               <a:rPr lang="en-IN" smtClean="0"/>
-              <a:t>26/01/26</a:t>
+              <a:t>31/01/26</a:t>
             </a:fld>
             <a:endParaRPr lang="en-US"/>
           </a:p>
@@ -3063,7 +3103,7 @@
           <a:p>
             <a:fld id="{7C93A90F-FA70-3E47-9BBA-18D6215A5B36}" type="datetime1">
               <a:rPr lang="en-IN" smtClean="0"/>
-              <a:t>26/01/26</a:t>
+              <a:t>31/01/26</a:t>
             </a:fld>
             <a:endParaRPr lang="en-US"/>
           </a:p>
@@ -3184,7 +3224,7 @@
           <a:p>
             <a:fld id="{48CF2ADE-8A8E-B443-8D46-D9B134B84855}" type="datetime1">
               <a:rPr lang="en-IN" smtClean="0"/>
-              <a:t>26/01/26</a:t>
+              <a:t>31/01/26</a:t>
             </a:fld>
             <a:endParaRPr lang="en-US"/>
           </a:p>
@@ -3305,7 +3345,7 @@
           <a:p>
             <a:fld id="{B440496A-8400-6848-AC58-A04D5A58DFED}" type="datetime1">
               <a:rPr lang="en-IN" smtClean="0"/>
-              <a:t>26/01/26</a:t>
+              <a:t>31/01/26</a:t>
             </a:fld>
             <a:endParaRPr lang="en-US"/>
           </a:p>
@@ -3666,7 +3706,7 @@
           <a:p>
             <a:fld id="{2242BEAE-C4DC-794B-AFC2-3BF74B7B36F6}" type="datetime1">
               <a:rPr lang="en-IN" smtClean="0"/>
-              <a:t>26/01/26</a:t>
+              <a:t>31/01/26</a:t>
             </a:fld>
             <a:endParaRPr lang="en-US"/>
           </a:p>
@@ -4176,7 +4216,7 @@
           <a:p>
             <a:fld id="{1F21900C-6887-7F40-BDA0-577016359EF8}" type="datetime1">
               <a:rPr lang="en-IN" smtClean="0"/>
-              <a:t>26/01/26</a:t>
+              <a:t>31/01/26</a:t>
             </a:fld>
             <a:endParaRPr lang="en-US"/>
           </a:p>
@@ -4534,7 +4574,7 @@
           <a:p>
             <a:fld id="{5B9464B0-3E51-C74D-AF1E-502AF719137F}" type="datetime1">
               <a:rPr lang="en-IN" smtClean="0"/>
-              <a:t>26/01/26</a:t>
+              <a:t>31/01/26</a:t>
             </a:fld>
             <a:endParaRPr lang="en-US"/>
           </a:p>
@@ -14577,7 +14617,7 @@
         </p:nvGraphicFramePr>
         <p:xfrm>
           <a:off x="874033" y="4933927"/>
-          <a:ext cx="5113111" cy="598425"/>
+          <a:ext cx="5113111" cy="598234"/>
         </p:xfrm>
         <a:graphic>
           <a:graphicData uri="http://schemas.openxmlformats.org/drawingml/2006/table">
@@ -16668,15 +16708,7 @@
             <a:pPr algn="ctr"/>
             <a:r>
               <a:rPr lang="en-US" dirty="0"/>
-              <a:t>Non Static/ </a:t>
-            </a:r>
-            <a:r>
-              <a:rPr lang="en-US" dirty="0" err="1"/>
-              <a:t>Intance</a:t>
-            </a:r>
-            <a:r>
-              <a:rPr lang="en-US" dirty="0"/>
-              <a:t> method</a:t>
+              <a:t>Non-Static/ Instance method</a:t>
             </a:r>
           </a:p>
         </p:txBody>
@@ -17064,15 +17096,7 @@
             </a:pPr>
             <a:r>
               <a:rPr lang="en-US" dirty="0"/>
-              <a:t>what is the return-type or </a:t>
-            </a:r>
-            <a:r>
-              <a:rPr lang="en-US" dirty="0" err="1"/>
-              <a:t>whats</a:t>
-            </a:r>
-            <a:r>
-              <a:rPr lang="en-US" dirty="0"/>
-              <a:t> does the method returns you </a:t>
+              <a:t>what is the return-type or what does the method returns you </a:t>
             </a:r>
           </a:p>
           <a:p>
@@ -18769,6 +18793,39 @@
             <a:r>
               <a:rPr lang="en-US" dirty="0"/>
               <a:t>)</a:t>
+            </a:r>
+          </a:p>
+        </p:txBody>
+      </p:sp>
+      <p:sp>
+        <p:nvSpPr>
+          <p:cNvPr id="2" name="Title 1">
+            <a:extLst>
+              <a:ext uri="{FF2B5EF4-FFF2-40B4-BE49-F238E27FC236}">
+                <a16:creationId xmlns:a16="http://schemas.microsoft.com/office/drawing/2014/main" id="{FE39C2FD-318C-420B-6FF0-2FA724AC666C}"/>
+              </a:ext>
+            </a:extLst>
+          </p:cNvPr>
+          <p:cNvSpPr>
+            <a:spLocks noGrp="1"/>
+          </p:cNvSpPr>
+          <p:nvPr>
+            <p:ph type="title"/>
+          </p:nvPr>
+        </p:nvSpPr>
+        <p:spPr>
+          <a:xfrm>
+            <a:off x="1069848" y="484632"/>
+            <a:ext cx="10058400" cy="1609344"/>
+          </a:xfrm>
+        </p:spPr>
+        <p:txBody>
+          <a:bodyPr/>
+          <a:lstStyle/>
+          <a:p>
+            <a:r>
+              <a:rPr lang="en-US" dirty="0"/>
+              <a:t>polymorphism</a:t>
             </a:r>
           </a:p>
         </p:txBody>
@@ -20118,7 +20175,28 @@
           <a:bodyPr/>
           <a:lstStyle/>
           <a:p>
-            <a:endParaRPr lang="en-US" dirty="0"/>
+            <a:r>
+              <a:rPr lang="en-US" dirty="0"/>
+              <a:t>In method overloading, same class will have same method with different arguments</a:t>
+            </a:r>
+          </a:p>
+          <a:p>
+            <a:r>
+              <a:rPr lang="en-US" dirty="0"/>
+              <a:t>Showing variation in no of arguments</a:t>
+            </a:r>
+          </a:p>
+          <a:p>
+            <a:r>
+              <a:rPr lang="en-US" dirty="0"/>
+              <a:t>Difference in data types</a:t>
+            </a:r>
+          </a:p>
+          <a:p>
+            <a:r>
+              <a:rPr lang="en-US" dirty="0"/>
+              <a:t>Change in order of arguments (few cases it wont work so we don’t prefer).</a:t>
+            </a:r>
           </a:p>
         </p:txBody>
       </p:sp>
@@ -20157,10 +20235,10 @@
       </p:grpSpPr>
       <p:sp>
         <p:nvSpPr>
-          <p:cNvPr id="4" name="Title 3">
-            <a:extLst>
-              <a:ext uri="{FF2B5EF4-FFF2-40B4-BE49-F238E27FC236}">
-                <a16:creationId xmlns:a16="http://schemas.microsoft.com/office/drawing/2014/main" id="{A017BD99-A756-A6AC-7E17-ED86A78997D5}"/>
+          <p:cNvPr id="2" name="Title 1">
+            <a:extLst>
+              <a:ext uri="{FF2B5EF4-FFF2-40B4-BE49-F238E27FC236}">
+                <a16:creationId xmlns:a16="http://schemas.microsoft.com/office/drawing/2014/main" id="{64B2EE9C-5178-B0F8-B90A-5D469B2CFD44}"/>
               </a:ext>
             </a:extLst>
           </p:cNvPr>
@@ -20168,7 +20246,7 @@
             <a:spLocks noGrp="1"/>
           </p:cNvSpPr>
           <p:nvPr>
-            <p:ph type="ctrTitle"/>
+            <p:ph type="title"/>
           </p:nvPr>
         </p:nvSpPr>
         <p:spPr/>
@@ -20176,20 +20254,19 @@
           <a:bodyPr/>
           <a:lstStyle/>
           <a:p>
-            <a:pPr algn="ctr"/>
-            <a:r>
-              <a:rPr lang="en-US" dirty="0"/>
-              <a:t>Inheritance</a:t>
-            </a:r>
-          </a:p>
-        </p:txBody>
-      </p:sp>
-      <p:sp>
-        <p:nvSpPr>
-          <p:cNvPr id="5" name="Subtitle 4">
-            <a:extLst>
-              <a:ext uri="{FF2B5EF4-FFF2-40B4-BE49-F238E27FC236}">
-                <a16:creationId xmlns:a16="http://schemas.microsoft.com/office/drawing/2014/main" id="{8F094933-12B5-A8A0-D13B-0F479404A0B1}"/>
+            <a:r>
+              <a:rPr lang="en-US" dirty="0"/>
+              <a:t>Constructor</a:t>
+            </a:r>
+          </a:p>
+        </p:txBody>
+      </p:sp>
+      <p:sp>
+        <p:nvSpPr>
+          <p:cNvPr id="3" name="Content Placeholder 2">
+            <a:extLst>
+              <a:ext uri="{FF2B5EF4-FFF2-40B4-BE49-F238E27FC236}">
+                <a16:creationId xmlns:a16="http://schemas.microsoft.com/office/drawing/2014/main" id="{BC1AF68B-0330-9D63-75AC-31BF1C5AAEDA}"/>
               </a:ext>
             </a:extLst>
           </p:cNvPr>
@@ -20197,7 +20274,7 @@
             <a:spLocks noGrp="1"/>
           </p:cNvSpPr>
           <p:nvPr>
-            <p:ph type="subTitle" idx="1"/>
+            <p:ph idx="1"/>
           </p:nvPr>
         </p:nvSpPr>
         <p:spPr/>
@@ -20205,14 +20282,78 @@
           <a:bodyPr/>
           <a:lstStyle/>
           <a:p>
-            <a:endParaRPr lang="en-US"/>
+            <a:r>
+              <a:rPr lang="en-US" dirty="0"/>
+              <a:t>If a method name is same as class name, then it is called CONSTRUCTOR.</a:t>
+            </a:r>
+          </a:p>
+          <a:p>
+            <a:pPr marL="0" indent="0">
+              <a:buNone/>
+            </a:pPr>
+            <a:r>
+              <a:rPr lang="en-US" b="1" dirty="0"/>
+              <a:t>Rules:</a:t>
+            </a:r>
+          </a:p>
+          <a:p>
+            <a:r>
+              <a:rPr lang="en-US" dirty="0"/>
+              <a:t>Must match with </a:t>
+            </a:r>
+            <a:r>
+              <a:rPr lang="en-US" dirty="0" err="1"/>
+              <a:t>ClassName</a:t>
+            </a:r>
+            <a:endParaRPr lang="en-US" dirty="0"/>
+          </a:p>
+          <a:p>
+            <a:r>
+              <a:rPr lang="en-US" dirty="0"/>
+              <a:t>It may have arguments but no return type</a:t>
+            </a:r>
+          </a:p>
+          <a:p>
+            <a:r>
+              <a:rPr lang="en-US" dirty="0"/>
+              <a:t>It should not have modifier</a:t>
+            </a:r>
+          </a:p>
+          <a:p>
+            <a:r>
+              <a:rPr lang="en-US" dirty="0"/>
+              <a:t>Manual calling of constructor is not possible but constructor executes during class  file loading.</a:t>
+            </a:r>
+          </a:p>
+          <a:p>
+            <a:r>
+              <a:rPr lang="en-US" dirty="0"/>
+              <a:t>Access-Specifier : </a:t>
+            </a:r>
+          </a:p>
+          <a:p>
+            <a:pPr lvl="8"/>
+            <a:r>
+              <a:rPr lang="en-US" dirty="0"/>
+              <a:t>Public or protected (preferred)</a:t>
+            </a:r>
+          </a:p>
+          <a:p>
+            <a:pPr lvl="8"/>
+            <a:r>
+              <a:rPr lang="en-US" dirty="0"/>
+              <a:t>Private or default (not preferred)</a:t>
+            </a:r>
+          </a:p>
+          <a:p>
+            <a:endParaRPr lang="en-US" dirty="0"/>
           </a:p>
         </p:txBody>
       </p:sp>
     </p:spTree>
     <p:extLst>
       <p:ext uri="{BB962C8B-B14F-4D97-AF65-F5344CB8AC3E}">
-        <p14:creationId xmlns:p14="http://schemas.microsoft.com/office/powerpoint/2010/main" val="2615539531"/>
+        <p14:creationId xmlns:p14="http://schemas.microsoft.com/office/powerpoint/2010/main" val="2974300477"/>
       </p:ext>
     </p:extLst>
   </p:cSld>
@@ -20244,6 +20385,188 @@
       </p:grpSpPr>
       <p:sp>
         <p:nvSpPr>
+          <p:cNvPr id="2" name="Title 1">
+            <a:extLst>
+              <a:ext uri="{FF2B5EF4-FFF2-40B4-BE49-F238E27FC236}">
+                <a16:creationId xmlns:a16="http://schemas.microsoft.com/office/drawing/2014/main" id="{F9389065-B017-86A3-F66A-10B544F83360}"/>
+              </a:ext>
+            </a:extLst>
+          </p:cNvPr>
+          <p:cNvSpPr>
+            <a:spLocks noGrp="1"/>
+          </p:cNvSpPr>
+          <p:nvPr>
+            <p:ph type="title"/>
+          </p:nvPr>
+        </p:nvSpPr>
+        <p:spPr/>
+        <p:txBody>
+          <a:bodyPr/>
+          <a:lstStyle/>
+          <a:p>
+            <a:r>
+              <a:rPr lang="en-US" dirty="0"/>
+              <a:t>Constructor overloading</a:t>
+            </a:r>
+          </a:p>
+        </p:txBody>
+      </p:sp>
+      <p:sp>
+        <p:nvSpPr>
+          <p:cNvPr id="3" name="Content Placeholder 2">
+            <a:extLst>
+              <a:ext uri="{FF2B5EF4-FFF2-40B4-BE49-F238E27FC236}">
+                <a16:creationId xmlns:a16="http://schemas.microsoft.com/office/drawing/2014/main" id="{2D4858F4-0A04-A2D9-46A0-BAA1266C6A94}"/>
+              </a:ext>
+            </a:extLst>
+          </p:cNvPr>
+          <p:cNvSpPr>
+            <a:spLocks noGrp="1"/>
+          </p:cNvSpPr>
+          <p:nvPr>
+            <p:ph idx="1"/>
+          </p:nvPr>
+        </p:nvSpPr>
+        <p:spPr/>
+        <p:txBody>
+          <a:bodyPr/>
+          <a:lstStyle/>
+          <a:p>
+            <a:r>
+              <a:rPr lang="en-US" dirty="0"/>
+              <a:t>Same constructor name but different parameters</a:t>
+            </a:r>
+          </a:p>
+          <a:p>
+            <a:endParaRPr lang="en-US" dirty="0"/>
+          </a:p>
+          <a:p>
+            <a:endParaRPr lang="en-US" dirty="0"/>
+          </a:p>
+        </p:txBody>
+      </p:sp>
+    </p:spTree>
+    <p:extLst>
+      <p:ext uri="{BB962C8B-B14F-4D97-AF65-F5344CB8AC3E}">
+        <p14:creationId xmlns:p14="http://schemas.microsoft.com/office/powerpoint/2010/main" val="3566847242"/>
+      </p:ext>
+    </p:extLst>
+  </p:cSld>
+  <p:clrMapOvr>
+    <a:masterClrMapping/>
+  </p:clrMapOvr>
+  <p:transition spd="slow">
+    <p:push dir="u"/>
+  </p:transition>
+</p:sld>
+</file>
+
+<file path=ppt/slides/slide44.xml><?xml version="1.0" encoding="utf-8"?>
+<p:sld xmlns:a="http://schemas.openxmlformats.org/drawingml/2006/main" xmlns:r="http://schemas.openxmlformats.org/officeDocument/2006/relationships" xmlns:p="http://schemas.openxmlformats.org/presentationml/2006/main">
+  <p:cSld>
+    <p:spTree>
+      <p:nvGrpSpPr>
+        <p:cNvPr id="1" name=""/>
+        <p:cNvGrpSpPr/>
+        <p:nvPr/>
+      </p:nvGrpSpPr>
+      <p:grpSpPr>
+        <a:xfrm>
+          <a:off x="0" y="0"/>
+          <a:ext cx="0" cy="0"/>
+          <a:chOff x="0" y="0"/>
+          <a:chExt cx="0" cy="0"/>
+        </a:xfrm>
+      </p:grpSpPr>
+      <p:sp>
+        <p:nvSpPr>
+          <p:cNvPr id="4" name="Title 3">
+            <a:extLst>
+              <a:ext uri="{FF2B5EF4-FFF2-40B4-BE49-F238E27FC236}">
+                <a16:creationId xmlns:a16="http://schemas.microsoft.com/office/drawing/2014/main" id="{A017BD99-A756-A6AC-7E17-ED86A78997D5}"/>
+              </a:ext>
+            </a:extLst>
+          </p:cNvPr>
+          <p:cNvSpPr>
+            <a:spLocks noGrp="1"/>
+          </p:cNvSpPr>
+          <p:nvPr>
+            <p:ph type="ctrTitle"/>
+          </p:nvPr>
+        </p:nvSpPr>
+        <p:spPr/>
+        <p:txBody>
+          <a:bodyPr/>
+          <a:lstStyle/>
+          <a:p>
+            <a:pPr algn="ctr"/>
+            <a:r>
+              <a:rPr lang="en-US" dirty="0"/>
+              <a:t>Inheritance</a:t>
+            </a:r>
+          </a:p>
+        </p:txBody>
+      </p:sp>
+      <p:sp>
+        <p:nvSpPr>
+          <p:cNvPr id="5" name="Subtitle 4">
+            <a:extLst>
+              <a:ext uri="{FF2B5EF4-FFF2-40B4-BE49-F238E27FC236}">
+                <a16:creationId xmlns:a16="http://schemas.microsoft.com/office/drawing/2014/main" id="{8F094933-12B5-A8A0-D13B-0F479404A0B1}"/>
+              </a:ext>
+            </a:extLst>
+          </p:cNvPr>
+          <p:cNvSpPr>
+            <a:spLocks noGrp="1"/>
+          </p:cNvSpPr>
+          <p:nvPr>
+            <p:ph type="subTitle" idx="1"/>
+          </p:nvPr>
+        </p:nvSpPr>
+        <p:spPr/>
+        <p:txBody>
+          <a:bodyPr/>
+          <a:lstStyle/>
+          <a:p>
+            <a:endParaRPr lang="en-US"/>
+          </a:p>
+        </p:txBody>
+      </p:sp>
+    </p:spTree>
+    <p:extLst>
+      <p:ext uri="{BB962C8B-B14F-4D97-AF65-F5344CB8AC3E}">
+        <p14:creationId xmlns:p14="http://schemas.microsoft.com/office/powerpoint/2010/main" val="2615539531"/>
+      </p:ext>
+    </p:extLst>
+  </p:cSld>
+  <p:clrMapOvr>
+    <a:masterClrMapping/>
+  </p:clrMapOvr>
+  <p:transition spd="slow">
+    <p:push dir="u"/>
+  </p:transition>
+</p:sld>
+</file>
+
+<file path=ppt/slides/slide45.xml><?xml version="1.0" encoding="utf-8"?>
+<p:sld xmlns:a="http://schemas.openxmlformats.org/drawingml/2006/main" xmlns:r="http://schemas.openxmlformats.org/officeDocument/2006/relationships" xmlns:p="http://schemas.openxmlformats.org/presentationml/2006/main">
+  <p:cSld>
+    <p:spTree>
+      <p:nvGrpSpPr>
+        <p:cNvPr id="1" name=""/>
+        <p:cNvGrpSpPr/>
+        <p:nvPr/>
+      </p:nvGrpSpPr>
+      <p:grpSpPr>
+        <a:xfrm>
+          <a:off x="0" y="0"/>
+          <a:ext cx="0" cy="0"/>
+          <a:chOff x="0" y="0"/>
+          <a:chExt cx="0" cy="0"/>
+        </a:xfrm>
+      </p:grpSpPr>
+      <p:sp>
+        <p:nvSpPr>
           <p:cNvPr id="3" name="Content Placeholder 2">
             <a:extLst>
               <a:ext uri="{FF2B5EF4-FFF2-40B4-BE49-F238E27FC236}">
@@ -20399,7 +20722,7 @@
 </p:sld>
 </file>
 
-<file path=ppt/slides/slide44.xml><?xml version="1.0" encoding="utf-8"?>
+<file path=ppt/slides/slide46.xml><?xml version="1.0" encoding="utf-8"?>
 <p:sld xmlns:a="http://schemas.openxmlformats.org/drawingml/2006/main" xmlns:r="http://schemas.openxmlformats.org/officeDocument/2006/relationships" xmlns:p="http://schemas.openxmlformats.org/presentationml/2006/main">
   <p:cSld>
     <p:spTree>
@@ -21265,7 +21588,7 @@
 </p:sld>
 </file>
 
-<file path=ppt/slides/slide45.xml><?xml version="1.0" encoding="utf-8"?>
+<file path=ppt/slides/slide47.xml><?xml version="1.0" encoding="utf-8"?>
 <p:sld xmlns:a="http://schemas.openxmlformats.org/drawingml/2006/main" xmlns:r="http://schemas.openxmlformats.org/officeDocument/2006/relationships" xmlns:p="http://schemas.openxmlformats.org/presentationml/2006/main">
   <p:cSld>
     <p:spTree>
@@ -21777,7 +22100,7 @@
 </p:sld>
 </file>
 
-<file path=ppt/slides/slide46.xml><?xml version="1.0" encoding="utf-8"?>
+<file path=ppt/slides/slide48.xml><?xml version="1.0" encoding="utf-8"?>
 <p:sld xmlns:a="http://schemas.openxmlformats.org/drawingml/2006/main" xmlns:r="http://schemas.openxmlformats.org/officeDocument/2006/relationships" xmlns:p="http://schemas.openxmlformats.org/presentationml/2006/main">
   <p:cSld>
     <p:spTree>
@@ -22819,263 +23142,6 @@
 </p:sld>
 </file>
 
-<file path=ppt/slides/slide47.xml><?xml version="1.0" encoding="utf-8"?>
-<p:sld xmlns:a="http://schemas.openxmlformats.org/drawingml/2006/main" xmlns:r="http://schemas.openxmlformats.org/officeDocument/2006/relationships" xmlns:p="http://schemas.openxmlformats.org/presentationml/2006/main">
-  <p:cSld>
-    <p:spTree>
-      <p:nvGrpSpPr>
-        <p:cNvPr id="1" name=""/>
-        <p:cNvGrpSpPr/>
-        <p:nvPr/>
-      </p:nvGrpSpPr>
-      <p:grpSpPr>
-        <a:xfrm>
-          <a:off x="0" y="0"/>
-          <a:ext cx="0" cy="0"/>
-          <a:chOff x="0" y="0"/>
-          <a:chExt cx="0" cy="0"/>
-        </a:xfrm>
-      </p:grpSpPr>
-      <p:sp>
-        <p:nvSpPr>
-          <p:cNvPr id="2" name="Title 1">
-            <a:extLst>
-              <a:ext uri="{FF2B5EF4-FFF2-40B4-BE49-F238E27FC236}">
-                <a16:creationId xmlns:a16="http://schemas.microsoft.com/office/drawing/2014/main" id="{99901167-A8C7-397A-6E68-338363FE2048}"/>
-              </a:ext>
-            </a:extLst>
-          </p:cNvPr>
-          <p:cNvSpPr>
-            <a:spLocks noGrp="1"/>
-          </p:cNvSpPr>
-          <p:nvPr>
-            <p:ph type="title"/>
-          </p:nvPr>
-        </p:nvSpPr>
-        <p:spPr/>
-        <p:txBody>
-          <a:bodyPr/>
-          <a:lstStyle/>
-          <a:p>
-            <a:r>
-              <a:rPr lang="en-US" dirty="0"/>
-              <a:t>Method Overriding</a:t>
-            </a:r>
-          </a:p>
-        </p:txBody>
-      </p:sp>
-      <p:sp>
-        <p:nvSpPr>
-          <p:cNvPr id="3" name="Content Placeholder 2">
-            <a:extLst>
-              <a:ext uri="{FF2B5EF4-FFF2-40B4-BE49-F238E27FC236}">
-                <a16:creationId xmlns:a16="http://schemas.microsoft.com/office/drawing/2014/main" id="{AE0D4C1B-FEAA-4C22-9284-B1E011AFC59E}"/>
-              </a:ext>
-            </a:extLst>
-          </p:cNvPr>
-          <p:cNvSpPr>
-            <a:spLocks noGrp="1"/>
-          </p:cNvSpPr>
-          <p:nvPr>
-            <p:ph idx="1"/>
-          </p:nvPr>
-        </p:nvSpPr>
-        <p:spPr/>
-        <p:txBody>
-          <a:bodyPr/>
-          <a:lstStyle/>
-          <a:p>
-            <a:r>
-              <a:rPr lang="en-US" dirty="0"/>
-              <a:t>Same method name with same signature(method name , parameter list) in different classes having relationship (inheritance)</a:t>
-            </a:r>
-          </a:p>
-          <a:p>
-            <a:r>
-              <a:rPr lang="en-US" dirty="0"/>
-              <a:t>Method calling order is based on the created object having inheritance</a:t>
-            </a:r>
-          </a:p>
-          <a:p>
-            <a:r>
-              <a:rPr lang="en-US" dirty="0"/>
-              <a:t>“super” keyword is used to refer parent class instead of child class.</a:t>
-            </a:r>
-          </a:p>
-        </p:txBody>
-      </p:sp>
-    </p:spTree>
-    <p:extLst>
-      <p:ext uri="{BB962C8B-B14F-4D97-AF65-F5344CB8AC3E}">
-        <p14:creationId xmlns:p14="http://schemas.microsoft.com/office/powerpoint/2010/main" val="3218362889"/>
-      </p:ext>
-    </p:extLst>
-  </p:cSld>
-  <p:clrMapOvr>
-    <a:masterClrMapping/>
-  </p:clrMapOvr>
-  <p:transition spd="slow">
-    <p:push dir="u"/>
-  </p:transition>
-</p:sld>
-</file>
-
-<file path=ppt/slides/slide48.xml><?xml version="1.0" encoding="utf-8"?>
-<p:sld xmlns:a="http://schemas.openxmlformats.org/drawingml/2006/main" xmlns:r="http://schemas.openxmlformats.org/officeDocument/2006/relationships" xmlns:p="http://schemas.openxmlformats.org/presentationml/2006/main">
-  <p:cSld>
-    <p:spTree>
-      <p:nvGrpSpPr>
-        <p:cNvPr id="1" name=""/>
-        <p:cNvGrpSpPr/>
-        <p:nvPr/>
-      </p:nvGrpSpPr>
-      <p:grpSpPr>
-        <a:xfrm>
-          <a:off x="0" y="0"/>
-          <a:ext cx="0" cy="0"/>
-          <a:chOff x="0" y="0"/>
-          <a:chExt cx="0" cy="0"/>
-        </a:xfrm>
-      </p:grpSpPr>
-      <p:sp>
-        <p:nvSpPr>
-          <p:cNvPr id="2" name="Title 1">
-            <a:extLst>
-              <a:ext uri="{FF2B5EF4-FFF2-40B4-BE49-F238E27FC236}">
-                <a16:creationId xmlns:a16="http://schemas.microsoft.com/office/drawing/2014/main" id="{8093D630-BA3C-D6D4-F08A-B5A9131995AA}"/>
-              </a:ext>
-            </a:extLst>
-          </p:cNvPr>
-          <p:cNvSpPr>
-            <a:spLocks noGrp="1"/>
-          </p:cNvSpPr>
-          <p:nvPr>
-            <p:ph type="title"/>
-          </p:nvPr>
-        </p:nvSpPr>
-        <p:spPr/>
-        <p:txBody>
-          <a:bodyPr/>
-          <a:lstStyle/>
-          <a:p>
-            <a:r>
-              <a:rPr lang="en-US" dirty="0"/>
-              <a:t>Super keyword</a:t>
-            </a:r>
-          </a:p>
-        </p:txBody>
-      </p:sp>
-      <p:sp>
-        <p:nvSpPr>
-          <p:cNvPr id="3" name="Content Placeholder 2">
-            <a:extLst>
-              <a:ext uri="{FF2B5EF4-FFF2-40B4-BE49-F238E27FC236}">
-                <a16:creationId xmlns:a16="http://schemas.microsoft.com/office/drawing/2014/main" id="{514D825B-A288-1F27-E5AA-5C317DF2FB2C}"/>
-              </a:ext>
-            </a:extLst>
-          </p:cNvPr>
-          <p:cNvSpPr>
-            <a:spLocks noGrp="1"/>
-          </p:cNvSpPr>
-          <p:nvPr>
-            <p:ph idx="1"/>
-          </p:nvPr>
-        </p:nvSpPr>
-        <p:spPr/>
-        <p:txBody>
-          <a:bodyPr/>
-          <a:lstStyle/>
-          <a:p>
-            <a:r>
-              <a:rPr lang="en-US" dirty="0"/>
-              <a:t>If you want to refer parent variable in child class(when child class variable or method is same as parent class) then we need to use “</a:t>
-            </a:r>
-            <a:r>
-              <a:rPr lang="en-US" b="1" dirty="0">
-                <a:solidFill>
-                  <a:srgbClr val="FF0000"/>
-                </a:solidFill>
-              </a:rPr>
-              <a:t>super</a:t>
-            </a:r>
-            <a:r>
-              <a:rPr lang="en-US" dirty="0"/>
-              <a:t>” keyword.</a:t>
-            </a:r>
-          </a:p>
-          <a:p>
-            <a:r>
-              <a:rPr lang="en-US" dirty="0"/>
-              <a:t>It is a non static refence</a:t>
-            </a:r>
-          </a:p>
-          <a:p>
-            <a:r>
-              <a:rPr lang="en-US" dirty="0"/>
-              <a:t>Syntax:</a:t>
-            </a:r>
-          </a:p>
-          <a:p>
-            <a:pPr marL="0" indent="0">
-              <a:buNone/>
-            </a:pPr>
-            <a:r>
-              <a:rPr lang="en-US" dirty="0"/>
-              <a:t>        </a:t>
-            </a:r>
-            <a:r>
-              <a:rPr lang="en-US" dirty="0" err="1"/>
-              <a:t>super.a</a:t>
-            </a:r>
-            <a:r>
-              <a:rPr lang="en-US" dirty="0"/>
-              <a:t>; // to call parent variable from child class.</a:t>
-            </a:r>
-          </a:p>
-          <a:p>
-            <a:pPr marL="0" indent="0">
-              <a:buNone/>
-            </a:pPr>
-            <a:r>
-              <a:rPr lang="en-US" dirty="0"/>
-              <a:t>        </a:t>
-            </a:r>
-            <a:r>
-              <a:rPr lang="en-US" dirty="0" err="1"/>
-              <a:t>super.method</a:t>
-            </a:r>
-            <a:r>
-              <a:rPr lang="en-US" dirty="0"/>
-              <a:t>(); //To call parent method from child class.</a:t>
-            </a:r>
-          </a:p>
-          <a:p>
-            <a:pPr marL="0" indent="0">
-              <a:buNone/>
-            </a:pPr>
-            <a:r>
-              <a:rPr lang="en-US" dirty="0"/>
-              <a:t>        super(parameter); //To call the parent overloaded construction.</a:t>
-            </a:r>
-          </a:p>
-        </p:txBody>
-      </p:sp>
-    </p:spTree>
-    <p:extLst>
-      <p:ext uri="{BB962C8B-B14F-4D97-AF65-F5344CB8AC3E}">
-        <p14:creationId xmlns:p14="http://schemas.microsoft.com/office/powerpoint/2010/main" val="3175049883"/>
-      </p:ext>
-    </p:extLst>
-  </p:cSld>
-  <p:clrMapOvr>
-    <a:masterClrMapping/>
-  </p:clrMapOvr>
-  <p:transition spd="slow">
-    <p:push dir="u"/>
-  </p:transition>
-</p:sld>
-</file>
-
 <file path=ppt/slides/slide49.xml><?xml version="1.0" encoding="utf-8"?>
 <p:sld xmlns:a="http://schemas.openxmlformats.org/drawingml/2006/main" xmlns:r="http://schemas.openxmlformats.org/officeDocument/2006/relationships" xmlns:p="http://schemas.openxmlformats.org/presentationml/2006/main">
   <p:cSld>
@@ -23095,10 +23161,10 @@
       </p:grpSpPr>
       <p:sp>
         <p:nvSpPr>
-          <p:cNvPr id="4" name="Title 3">
-            <a:extLst>
-              <a:ext uri="{FF2B5EF4-FFF2-40B4-BE49-F238E27FC236}">
-                <a16:creationId xmlns:a16="http://schemas.microsoft.com/office/drawing/2014/main" id="{0548507E-20B0-75B4-1094-A7D1336BD3ED}"/>
+          <p:cNvPr id="2" name="Title 1">
+            <a:extLst>
+              <a:ext uri="{FF2B5EF4-FFF2-40B4-BE49-F238E27FC236}">
+                <a16:creationId xmlns:a16="http://schemas.microsoft.com/office/drawing/2014/main" id="{99901167-A8C7-397A-6E68-338363FE2048}"/>
               </a:ext>
             </a:extLst>
           </p:cNvPr>
@@ -23106,7 +23172,7 @@
             <a:spLocks noGrp="1"/>
           </p:cNvSpPr>
           <p:nvPr>
-            <p:ph type="ctrTitle"/>
+            <p:ph type="title"/>
           </p:nvPr>
         </p:nvSpPr>
         <p:spPr/>
@@ -23116,17 +23182,17 @@
           <a:p>
             <a:r>
               <a:rPr lang="en-US" dirty="0"/>
-              <a:t>Abstraction</a:t>
-            </a:r>
-          </a:p>
-        </p:txBody>
-      </p:sp>
-      <p:sp>
-        <p:nvSpPr>
-          <p:cNvPr id="5" name="Subtitle 4">
-            <a:extLst>
-              <a:ext uri="{FF2B5EF4-FFF2-40B4-BE49-F238E27FC236}">
-                <a16:creationId xmlns:a16="http://schemas.microsoft.com/office/drawing/2014/main" id="{094F2EED-B6E1-8804-6EBE-ABAEB5E1DD73}"/>
+              <a:t>Method Overriding</a:t>
+            </a:r>
+          </a:p>
+        </p:txBody>
+      </p:sp>
+      <p:sp>
+        <p:nvSpPr>
+          <p:cNvPr id="3" name="Content Placeholder 2">
+            <a:extLst>
+              <a:ext uri="{FF2B5EF4-FFF2-40B4-BE49-F238E27FC236}">
+                <a16:creationId xmlns:a16="http://schemas.microsoft.com/office/drawing/2014/main" id="{AE0D4C1B-FEAA-4C22-9284-B1E011AFC59E}"/>
               </a:ext>
             </a:extLst>
           </p:cNvPr>
@@ -23134,7 +23200,7 @@
             <a:spLocks noGrp="1"/>
           </p:cNvSpPr>
           <p:nvPr>
-            <p:ph type="subTitle" idx="1"/>
+            <p:ph idx="1"/>
           </p:nvPr>
         </p:nvSpPr>
         <p:spPr/>
@@ -23142,14 +23208,37 @@
           <a:bodyPr/>
           <a:lstStyle/>
           <a:p>
-            <a:endParaRPr lang="en-US"/>
+            <a:r>
+              <a:rPr lang="en-US" dirty="0"/>
+              <a:t>Same method name with same signature(method name , parameter list) in different classes having relationship (inheritance)</a:t>
+            </a:r>
+          </a:p>
+          <a:p>
+            <a:r>
+              <a:rPr lang="en-US" dirty="0"/>
+              <a:t>Method calling order is based on the created object having inheritance</a:t>
+            </a:r>
+          </a:p>
+          <a:p>
+            <a:r>
+              <a:rPr lang="en-US" dirty="0"/>
+              <a:t>“</a:t>
+            </a:r>
+            <a:r>
+              <a:rPr lang="en-US" b="1" dirty="0"/>
+              <a:t>super</a:t>
+            </a:r>
+            <a:r>
+              <a:rPr lang="en-US" dirty="0"/>
+              <a:t>” keyword is used to refer parent class instead of child class.</a:t>
+            </a:r>
           </a:p>
         </p:txBody>
       </p:sp>
     </p:spTree>
     <p:extLst>
       <p:ext uri="{BB962C8B-B14F-4D97-AF65-F5344CB8AC3E}">
-        <p14:creationId xmlns:p14="http://schemas.microsoft.com/office/powerpoint/2010/main" val="2990276585"/>
+        <p14:creationId xmlns:p14="http://schemas.microsoft.com/office/powerpoint/2010/main" val="3218362889"/>
       </p:ext>
     </p:extLst>
   </p:cSld>
@@ -23320,6 +23409,248 @@
       </p:grpSpPr>
       <p:sp>
         <p:nvSpPr>
+          <p:cNvPr id="2" name="Title 1">
+            <a:extLst>
+              <a:ext uri="{FF2B5EF4-FFF2-40B4-BE49-F238E27FC236}">
+                <a16:creationId xmlns:a16="http://schemas.microsoft.com/office/drawing/2014/main" id="{8093D630-BA3C-D6D4-F08A-B5A9131995AA}"/>
+              </a:ext>
+            </a:extLst>
+          </p:cNvPr>
+          <p:cNvSpPr>
+            <a:spLocks noGrp="1"/>
+          </p:cNvSpPr>
+          <p:nvPr>
+            <p:ph type="title"/>
+          </p:nvPr>
+        </p:nvSpPr>
+        <p:spPr/>
+        <p:txBody>
+          <a:bodyPr/>
+          <a:lstStyle/>
+          <a:p>
+            <a:r>
+              <a:rPr lang="en-US" dirty="0"/>
+              <a:t>Super keyword</a:t>
+            </a:r>
+          </a:p>
+        </p:txBody>
+      </p:sp>
+      <p:sp>
+        <p:nvSpPr>
+          <p:cNvPr id="3" name="Content Placeholder 2">
+            <a:extLst>
+              <a:ext uri="{FF2B5EF4-FFF2-40B4-BE49-F238E27FC236}">
+                <a16:creationId xmlns:a16="http://schemas.microsoft.com/office/drawing/2014/main" id="{514D825B-A288-1F27-E5AA-5C317DF2FB2C}"/>
+              </a:ext>
+            </a:extLst>
+          </p:cNvPr>
+          <p:cNvSpPr>
+            <a:spLocks noGrp="1"/>
+          </p:cNvSpPr>
+          <p:nvPr>
+            <p:ph idx="1"/>
+          </p:nvPr>
+        </p:nvSpPr>
+        <p:spPr/>
+        <p:txBody>
+          <a:bodyPr/>
+          <a:lstStyle/>
+          <a:p>
+            <a:r>
+              <a:rPr lang="en-US" dirty="0"/>
+              <a:t>If you want to refer parent variable in child class(when child class variable or method is same as parent class) then we need to use “</a:t>
+            </a:r>
+            <a:r>
+              <a:rPr lang="en-US" b="1" dirty="0">
+                <a:solidFill>
+                  <a:srgbClr val="FF0000"/>
+                </a:solidFill>
+              </a:rPr>
+              <a:t>super</a:t>
+            </a:r>
+            <a:r>
+              <a:rPr lang="en-US" dirty="0"/>
+              <a:t>” keyword.</a:t>
+            </a:r>
+          </a:p>
+          <a:p>
+            <a:r>
+              <a:rPr lang="en-US" dirty="0"/>
+              <a:t>It is a non static refence</a:t>
+            </a:r>
+          </a:p>
+          <a:p>
+            <a:r>
+              <a:rPr lang="en-US" dirty="0"/>
+              <a:t>Syntax:</a:t>
+            </a:r>
+          </a:p>
+          <a:p>
+            <a:pPr marL="0" indent="0">
+              <a:buNone/>
+            </a:pPr>
+            <a:r>
+              <a:rPr lang="en-US" dirty="0"/>
+              <a:t>        </a:t>
+            </a:r>
+            <a:r>
+              <a:rPr lang="en-US" dirty="0" err="1"/>
+              <a:t>super.a</a:t>
+            </a:r>
+            <a:r>
+              <a:rPr lang="en-US" dirty="0"/>
+              <a:t>; // to call parent variable from child class.</a:t>
+            </a:r>
+          </a:p>
+          <a:p>
+            <a:pPr marL="0" indent="0">
+              <a:buNone/>
+            </a:pPr>
+            <a:r>
+              <a:rPr lang="en-US" dirty="0"/>
+              <a:t>        </a:t>
+            </a:r>
+            <a:r>
+              <a:rPr lang="en-US" dirty="0" err="1"/>
+              <a:t>super.method</a:t>
+            </a:r>
+            <a:r>
+              <a:rPr lang="en-US" dirty="0"/>
+              <a:t>(); //To call parent method from child class.</a:t>
+            </a:r>
+          </a:p>
+          <a:p>
+            <a:pPr marL="0" indent="0">
+              <a:buNone/>
+            </a:pPr>
+            <a:r>
+              <a:rPr lang="en-US" dirty="0"/>
+              <a:t>        super(parameter); //To call the parent overloaded construction.</a:t>
+            </a:r>
+          </a:p>
+        </p:txBody>
+      </p:sp>
+    </p:spTree>
+    <p:extLst>
+      <p:ext uri="{BB962C8B-B14F-4D97-AF65-F5344CB8AC3E}">
+        <p14:creationId xmlns:p14="http://schemas.microsoft.com/office/powerpoint/2010/main" val="3175049883"/>
+      </p:ext>
+    </p:extLst>
+  </p:cSld>
+  <p:clrMapOvr>
+    <a:masterClrMapping/>
+  </p:clrMapOvr>
+  <p:transition spd="slow">
+    <p:push dir="u"/>
+  </p:transition>
+</p:sld>
+</file>
+
+<file path=ppt/slides/slide51.xml><?xml version="1.0" encoding="utf-8"?>
+<p:sld xmlns:a="http://schemas.openxmlformats.org/drawingml/2006/main" xmlns:r="http://schemas.openxmlformats.org/officeDocument/2006/relationships" xmlns:p="http://schemas.openxmlformats.org/presentationml/2006/main">
+  <p:cSld>
+    <p:spTree>
+      <p:nvGrpSpPr>
+        <p:cNvPr id="1" name=""/>
+        <p:cNvGrpSpPr/>
+        <p:nvPr/>
+      </p:nvGrpSpPr>
+      <p:grpSpPr>
+        <a:xfrm>
+          <a:off x="0" y="0"/>
+          <a:ext cx="0" cy="0"/>
+          <a:chOff x="0" y="0"/>
+          <a:chExt cx="0" cy="0"/>
+        </a:xfrm>
+      </p:grpSpPr>
+      <p:sp>
+        <p:nvSpPr>
+          <p:cNvPr id="4" name="Title 3">
+            <a:extLst>
+              <a:ext uri="{FF2B5EF4-FFF2-40B4-BE49-F238E27FC236}">
+                <a16:creationId xmlns:a16="http://schemas.microsoft.com/office/drawing/2014/main" id="{0548507E-20B0-75B4-1094-A7D1336BD3ED}"/>
+              </a:ext>
+            </a:extLst>
+          </p:cNvPr>
+          <p:cNvSpPr>
+            <a:spLocks noGrp="1"/>
+          </p:cNvSpPr>
+          <p:nvPr>
+            <p:ph type="ctrTitle"/>
+          </p:nvPr>
+        </p:nvSpPr>
+        <p:spPr/>
+        <p:txBody>
+          <a:bodyPr/>
+          <a:lstStyle/>
+          <a:p>
+            <a:r>
+              <a:rPr lang="en-US" dirty="0"/>
+              <a:t>Abstraction</a:t>
+            </a:r>
+          </a:p>
+        </p:txBody>
+      </p:sp>
+      <p:sp>
+        <p:nvSpPr>
+          <p:cNvPr id="5" name="Subtitle 4">
+            <a:extLst>
+              <a:ext uri="{FF2B5EF4-FFF2-40B4-BE49-F238E27FC236}">
+                <a16:creationId xmlns:a16="http://schemas.microsoft.com/office/drawing/2014/main" id="{094F2EED-B6E1-8804-6EBE-ABAEB5E1DD73}"/>
+              </a:ext>
+            </a:extLst>
+          </p:cNvPr>
+          <p:cNvSpPr>
+            <a:spLocks noGrp="1"/>
+          </p:cNvSpPr>
+          <p:nvPr>
+            <p:ph type="subTitle" idx="1"/>
+          </p:nvPr>
+        </p:nvSpPr>
+        <p:spPr/>
+        <p:txBody>
+          <a:bodyPr/>
+          <a:lstStyle/>
+          <a:p>
+            <a:endParaRPr lang="en-US"/>
+          </a:p>
+        </p:txBody>
+      </p:sp>
+    </p:spTree>
+    <p:extLst>
+      <p:ext uri="{BB962C8B-B14F-4D97-AF65-F5344CB8AC3E}">
+        <p14:creationId xmlns:p14="http://schemas.microsoft.com/office/powerpoint/2010/main" val="2990276585"/>
+      </p:ext>
+    </p:extLst>
+  </p:cSld>
+  <p:clrMapOvr>
+    <a:masterClrMapping/>
+  </p:clrMapOvr>
+  <p:transition spd="slow">
+    <p:push dir="u"/>
+  </p:transition>
+</p:sld>
+</file>
+
+<file path=ppt/slides/slide52.xml><?xml version="1.0" encoding="utf-8"?>
+<p:sld xmlns:a="http://schemas.openxmlformats.org/drawingml/2006/main" xmlns:r="http://schemas.openxmlformats.org/officeDocument/2006/relationships" xmlns:p="http://schemas.openxmlformats.org/presentationml/2006/main">
+  <p:cSld>
+    <p:spTree>
+      <p:nvGrpSpPr>
+        <p:cNvPr id="1" name=""/>
+        <p:cNvGrpSpPr/>
+        <p:nvPr/>
+      </p:nvGrpSpPr>
+      <p:grpSpPr>
+        <a:xfrm>
+          <a:off x="0" y="0"/>
+          <a:ext cx="0" cy="0"/>
+          <a:chOff x="0" y="0"/>
+          <a:chExt cx="0" cy="0"/>
+        </a:xfrm>
+      </p:grpSpPr>
+      <p:sp>
+        <p:nvSpPr>
           <p:cNvPr id="3" name="Content Placeholder 2">
             <a:extLst>
               <a:ext uri="{FF2B5EF4-FFF2-40B4-BE49-F238E27FC236}">
@@ -23427,7 +23758,7 @@
 </p:sld>
 </file>
 
-<file path=ppt/slides/slide51.xml><?xml version="1.0" encoding="utf-8"?>
+<file path=ppt/slides/slide53.xml><?xml version="1.0" encoding="utf-8"?>
 <p:sld xmlns:a="http://schemas.openxmlformats.org/drawingml/2006/main" xmlns:r="http://schemas.openxmlformats.org/officeDocument/2006/relationships" xmlns:p="http://schemas.openxmlformats.org/presentationml/2006/main">
   <p:cSld>
     <p:spTree>
@@ -23607,7 +23938,7 @@
 </p:sld>
 </file>
 
-<file path=ppt/slides/slide52.xml><?xml version="1.0" encoding="utf-8"?>
+<file path=ppt/slides/slide54.xml><?xml version="1.0" encoding="utf-8"?>
 <p:sld xmlns:a="http://schemas.openxmlformats.org/drawingml/2006/main" xmlns:r="http://schemas.openxmlformats.org/officeDocument/2006/relationships" xmlns:p="http://schemas.openxmlformats.org/presentationml/2006/main">
   <p:cSld>
     <p:spTree>
@@ -23693,7 +24024,7 @@
 </p:sld>
 </file>
 
-<file path=ppt/slides/slide53.xml><?xml version="1.0" encoding="utf-8"?>
+<file path=ppt/slides/slide55.xml><?xml version="1.0" encoding="utf-8"?>
 <p:sld xmlns:a="http://schemas.openxmlformats.org/drawingml/2006/main" xmlns:r="http://schemas.openxmlformats.org/officeDocument/2006/relationships" xmlns:p="http://schemas.openxmlformats.org/presentationml/2006/main">
   <p:cSld>
     <p:spTree>
@@ -23770,6 +24101,431 @@
     <p:extLst>
       <p:ext uri="{BB962C8B-B14F-4D97-AF65-F5344CB8AC3E}">
         <p14:creationId xmlns:p14="http://schemas.microsoft.com/office/powerpoint/2010/main" val="1058207518"/>
+      </p:ext>
+    </p:extLst>
+  </p:cSld>
+  <p:clrMapOvr>
+    <a:masterClrMapping/>
+  </p:clrMapOvr>
+  <p:transition spd="slow">
+    <p:push dir="u"/>
+  </p:transition>
+</p:sld>
+</file>
+
+<file path=ppt/slides/slide56.xml><?xml version="1.0" encoding="utf-8"?>
+<p:sld xmlns:a="http://schemas.openxmlformats.org/drawingml/2006/main" xmlns:r="http://schemas.openxmlformats.org/officeDocument/2006/relationships" xmlns:p="http://schemas.openxmlformats.org/presentationml/2006/main">
+  <p:cSld>
+    <p:spTree>
+      <p:nvGrpSpPr>
+        <p:cNvPr id="1" name=""/>
+        <p:cNvGrpSpPr/>
+        <p:nvPr/>
+      </p:nvGrpSpPr>
+      <p:grpSpPr>
+        <a:xfrm>
+          <a:off x="0" y="0"/>
+          <a:ext cx="0" cy="0"/>
+          <a:chOff x="0" y="0"/>
+          <a:chExt cx="0" cy="0"/>
+        </a:xfrm>
+      </p:grpSpPr>
+      <p:sp>
+        <p:nvSpPr>
+          <p:cNvPr id="4" name="Title 3">
+            <a:extLst>
+              <a:ext uri="{FF2B5EF4-FFF2-40B4-BE49-F238E27FC236}">
+                <a16:creationId xmlns:a16="http://schemas.microsoft.com/office/drawing/2014/main" id="{CDD38F6F-415A-FC09-07F5-FDC514DABAA6}"/>
+              </a:ext>
+            </a:extLst>
+          </p:cNvPr>
+          <p:cNvSpPr>
+            <a:spLocks noGrp="1"/>
+          </p:cNvSpPr>
+          <p:nvPr>
+            <p:ph type="ctrTitle"/>
+          </p:nvPr>
+        </p:nvSpPr>
+        <p:spPr/>
+        <p:txBody>
+          <a:bodyPr/>
+          <a:lstStyle/>
+          <a:p>
+            <a:r>
+              <a:rPr lang="en-US" dirty="0"/>
+              <a:t>Season 2</a:t>
+            </a:r>
+          </a:p>
+        </p:txBody>
+      </p:sp>
+      <p:sp>
+        <p:nvSpPr>
+          <p:cNvPr id="5" name="Subtitle 4">
+            <a:extLst>
+              <a:ext uri="{FF2B5EF4-FFF2-40B4-BE49-F238E27FC236}">
+                <a16:creationId xmlns:a16="http://schemas.microsoft.com/office/drawing/2014/main" id="{83B9A02D-473C-413D-DF0F-41F260594A05}"/>
+              </a:ext>
+            </a:extLst>
+          </p:cNvPr>
+          <p:cNvSpPr>
+            <a:spLocks noGrp="1"/>
+          </p:cNvSpPr>
+          <p:nvPr>
+            <p:ph type="subTitle" idx="1"/>
+          </p:nvPr>
+        </p:nvSpPr>
+        <p:spPr/>
+        <p:txBody>
+          <a:bodyPr/>
+          <a:lstStyle/>
+          <a:p>
+            <a:endParaRPr lang="en-US"/>
+          </a:p>
+        </p:txBody>
+      </p:sp>
+    </p:spTree>
+    <p:extLst>
+      <p:ext uri="{BB962C8B-B14F-4D97-AF65-F5344CB8AC3E}">
+        <p14:creationId xmlns:p14="http://schemas.microsoft.com/office/powerpoint/2010/main" val="3700218876"/>
+      </p:ext>
+    </p:extLst>
+  </p:cSld>
+  <p:clrMapOvr>
+    <a:masterClrMapping/>
+  </p:clrMapOvr>
+  <p:transition spd="slow">
+    <p:push dir="u"/>
+  </p:transition>
+</p:sld>
+</file>
+
+<file path=ppt/slides/slide57.xml><?xml version="1.0" encoding="utf-8"?>
+<p:sld xmlns:a="http://schemas.openxmlformats.org/drawingml/2006/main" xmlns:r="http://schemas.openxmlformats.org/officeDocument/2006/relationships" xmlns:p="http://schemas.openxmlformats.org/presentationml/2006/main">
+  <p:cSld>
+    <p:spTree>
+      <p:nvGrpSpPr>
+        <p:cNvPr id="1" name=""/>
+        <p:cNvGrpSpPr/>
+        <p:nvPr/>
+      </p:nvGrpSpPr>
+      <p:grpSpPr>
+        <a:xfrm>
+          <a:off x="0" y="0"/>
+          <a:ext cx="0" cy="0"/>
+          <a:chOff x="0" y="0"/>
+          <a:chExt cx="0" cy="0"/>
+        </a:xfrm>
+      </p:grpSpPr>
+      <p:sp>
+        <p:nvSpPr>
+          <p:cNvPr id="2" name="Title 1">
+            <a:extLst>
+              <a:ext uri="{FF2B5EF4-FFF2-40B4-BE49-F238E27FC236}">
+                <a16:creationId xmlns:a16="http://schemas.microsoft.com/office/drawing/2014/main" id="{AAD9C6DB-8B0B-9C12-31E6-7B2992B9E634}"/>
+              </a:ext>
+            </a:extLst>
+          </p:cNvPr>
+          <p:cNvSpPr>
+            <a:spLocks noGrp="1"/>
+          </p:cNvSpPr>
+          <p:nvPr>
+            <p:ph type="title"/>
+          </p:nvPr>
+        </p:nvSpPr>
+        <p:spPr/>
+        <p:txBody>
+          <a:bodyPr/>
+          <a:lstStyle/>
+          <a:p>
+            <a:endParaRPr lang="en-US"/>
+          </a:p>
+        </p:txBody>
+      </p:sp>
+      <p:pic>
+        <p:nvPicPr>
+          <p:cNvPr id="4" name="Content Placeholder 3">
+            <a:extLst>
+              <a:ext uri="{FF2B5EF4-FFF2-40B4-BE49-F238E27FC236}">
+                <a16:creationId xmlns:a16="http://schemas.microsoft.com/office/drawing/2014/main" id="{80352A4C-C206-5E89-C00F-2D4AAB4F8BD8}"/>
+              </a:ext>
+            </a:extLst>
+          </p:cNvPr>
+          <p:cNvPicPr>
+            <a:picLocks noGrp="1" noChangeAspect="1"/>
+          </p:cNvPicPr>
+          <p:nvPr>
+            <p:ph idx="1"/>
+          </p:nvPr>
+        </p:nvPicPr>
+        <p:blipFill>
+          <a:blip r:embed="rId2"/>
+          <a:stretch>
+            <a:fillRect/>
+          </a:stretch>
+        </p:blipFill>
+        <p:spPr>
+          <a:xfrm>
+            <a:off x="1355636" y="2120900"/>
+            <a:ext cx="9487077" cy="4051300"/>
+          </a:xfrm>
+          <a:prstGeom prst="rect">
+            <a:avLst/>
+          </a:prstGeom>
+        </p:spPr>
+      </p:pic>
+    </p:spTree>
+    <p:extLst>
+      <p:ext uri="{BB962C8B-B14F-4D97-AF65-F5344CB8AC3E}">
+        <p14:creationId xmlns:p14="http://schemas.microsoft.com/office/powerpoint/2010/main" val="3371005553"/>
+      </p:ext>
+    </p:extLst>
+  </p:cSld>
+  <p:clrMapOvr>
+    <a:masterClrMapping/>
+  </p:clrMapOvr>
+  <p:transition spd="slow">
+    <p:push dir="u"/>
+  </p:transition>
+</p:sld>
+</file>
+
+<file path=ppt/slides/slide58.xml><?xml version="1.0" encoding="utf-8"?>
+<p:sld xmlns:a="http://schemas.openxmlformats.org/drawingml/2006/main" xmlns:r="http://schemas.openxmlformats.org/officeDocument/2006/relationships" xmlns:p="http://schemas.openxmlformats.org/presentationml/2006/main">
+  <p:cSld>
+    <p:spTree>
+      <p:nvGrpSpPr>
+        <p:cNvPr id="1" name=""/>
+        <p:cNvGrpSpPr/>
+        <p:nvPr/>
+      </p:nvGrpSpPr>
+      <p:grpSpPr>
+        <a:xfrm>
+          <a:off x="0" y="0"/>
+          <a:ext cx="0" cy="0"/>
+          <a:chOff x="0" y="0"/>
+          <a:chExt cx="0" cy="0"/>
+        </a:xfrm>
+      </p:grpSpPr>
+      <p:sp>
+        <p:nvSpPr>
+          <p:cNvPr id="2" name="Title 1">
+            <a:extLst>
+              <a:ext uri="{FF2B5EF4-FFF2-40B4-BE49-F238E27FC236}">
+                <a16:creationId xmlns:a16="http://schemas.microsoft.com/office/drawing/2014/main" id="{0B4A48D3-A704-659D-FB6E-11028143542B}"/>
+              </a:ext>
+            </a:extLst>
+          </p:cNvPr>
+          <p:cNvSpPr>
+            <a:spLocks noGrp="1"/>
+          </p:cNvSpPr>
+          <p:nvPr>
+            <p:ph type="title"/>
+          </p:nvPr>
+        </p:nvSpPr>
+        <p:spPr/>
+        <p:txBody>
+          <a:bodyPr/>
+          <a:lstStyle/>
+          <a:p>
+            <a:endParaRPr lang="en-US"/>
+          </a:p>
+        </p:txBody>
+      </p:sp>
+      <p:sp>
+        <p:nvSpPr>
+          <p:cNvPr id="3" name="Content Placeholder 2">
+            <a:extLst>
+              <a:ext uri="{FF2B5EF4-FFF2-40B4-BE49-F238E27FC236}">
+                <a16:creationId xmlns:a16="http://schemas.microsoft.com/office/drawing/2014/main" id="{38CC5268-2AD4-B4DA-F3E9-9371CC225F63}"/>
+              </a:ext>
+            </a:extLst>
+          </p:cNvPr>
+          <p:cNvSpPr>
+            <a:spLocks noGrp="1"/>
+          </p:cNvSpPr>
+          <p:nvPr>
+            <p:ph idx="1"/>
+          </p:nvPr>
+        </p:nvSpPr>
+        <p:spPr/>
+        <p:txBody>
+          <a:bodyPr/>
+          <a:lstStyle/>
+          <a:p>
+            <a:r>
+              <a:rPr lang="en-US" dirty="0"/>
+              <a:t>It is a symbol which performs action</a:t>
+            </a:r>
+          </a:p>
+          <a:p>
+            <a:pPr marL="457200" indent="-457200">
+              <a:buFont typeface="+mj-lt"/>
+              <a:buAutoNum type="arabicPeriod"/>
+            </a:pPr>
+            <a:r>
+              <a:rPr lang="en-US" dirty="0"/>
+              <a:t>Unary</a:t>
+            </a:r>
+          </a:p>
+          <a:p>
+            <a:pPr marL="457200" indent="-457200">
+              <a:buFont typeface="+mj-lt"/>
+              <a:buAutoNum type="arabicPeriod"/>
+            </a:pPr>
+            <a:r>
+              <a:rPr lang="en-US" dirty="0"/>
+              <a:t>Binary</a:t>
+            </a:r>
+          </a:p>
+          <a:p>
+            <a:pPr marL="457200" indent="-457200">
+              <a:buFont typeface="+mj-lt"/>
+              <a:buAutoNum type="arabicPeriod"/>
+            </a:pPr>
+            <a:r>
+              <a:rPr lang="en-US" dirty="0"/>
+              <a:t>Ternary operator</a:t>
+            </a:r>
+          </a:p>
+          <a:p>
+            <a:r>
+              <a:rPr lang="en-US" dirty="0"/>
+              <a:t>Unary operator: ++(increment),--(decrement)</a:t>
+            </a:r>
+          </a:p>
+          <a:p>
+            <a:r>
+              <a:rPr lang="en-US" dirty="0"/>
+              <a:t>Increment operator: </a:t>
+            </a:r>
+            <a:r>
+              <a:rPr lang="en-US" dirty="0" err="1"/>
+              <a:t>preincrement</a:t>
+            </a:r>
+            <a:r>
+              <a:rPr lang="en-US" dirty="0"/>
+              <a:t> &amp; post increment operator</a:t>
+            </a:r>
+          </a:p>
+          <a:p>
+            <a:r>
+              <a:rPr lang="en-US" dirty="0"/>
+              <a:t>Decrement operator: </a:t>
+            </a:r>
+            <a:r>
+              <a:rPr lang="en-US" dirty="0" err="1"/>
+              <a:t>predecrement</a:t>
+            </a:r>
+            <a:r>
+              <a:rPr lang="en-US" dirty="0"/>
+              <a:t> operator &amp; post decrement operator</a:t>
+            </a:r>
+          </a:p>
+          <a:p>
+            <a:r>
+              <a:rPr lang="en-US" dirty="0"/>
+              <a:t>It is operator applicable only with 1 variable</a:t>
+            </a:r>
+          </a:p>
+        </p:txBody>
+      </p:sp>
+    </p:spTree>
+    <p:extLst>
+      <p:ext uri="{BB962C8B-B14F-4D97-AF65-F5344CB8AC3E}">
+        <p14:creationId xmlns:p14="http://schemas.microsoft.com/office/powerpoint/2010/main" val="528828904"/>
+      </p:ext>
+    </p:extLst>
+  </p:cSld>
+  <p:clrMapOvr>
+    <a:masterClrMapping/>
+  </p:clrMapOvr>
+  <p:transition spd="slow">
+    <p:push dir="u"/>
+  </p:transition>
+</p:sld>
+</file>
+
+<file path=ppt/slides/slide59.xml><?xml version="1.0" encoding="utf-8"?>
+<p:sld xmlns:a="http://schemas.openxmlformats.org/drawingml/2006/main" xmlns:r="http://schemas.openxmlformats.org/officeDocument/2006/relationships" xmlns:p="http://schemas.openxmlformats.org/presentationml/2006/main">
+  <p:cSld>
+    <p:spTree>
+      <p:nvGrpSpPr>
+        <p:cNvPr id="1" name=""/>
+        <p:cNvGrpSpPr/>
+        <p:nvPr/>
+      </p:nvGrpSpPr>
+      <p:grpSpPr>
+        <a:xfrm>
+          <a:off x="0" y="0"/>
+          <a:ext cx="0" cy="0"/>
+          <a:chOff x="0" y="0"/>
+          <a:chExt cx="0" cy="0"/>
+        </a:xfrm>
+      </p:grpSpPr>
+      <p:sp>
+        <p:nvSpPr>
+          <p:cNvPr id="2" name="Title 1">
+            <a:extLst>
+              <a:ext uri="{FF2B5EF4-FFF2-40B4-BE49-F238E27FC236}">
+                <a16:creationId xmlns:a16="http://schemas.microsoft.com/office/drawing/2014/main" id="{4301B6E1-9371-7FEB-43A6-2CF6CBAFBE86}"/>
+              </a:ext>
+            </a:extLst>
+          </p:cNvPr>
+          <p:cNvSpPr>
+            <a:spLocks noGrp="1"/>
+          </p:cNvSpPr>
+          <p:nvPr>
+            <p:ph type="title"/>
+          </p:nvPr>
+        </p:nvSpPr>
+        <p:spPr/>
+        <p:txBody>
+          <a:bodyPr/>
+          <a:lstStyle/>
+          <a:p>
+            <a:r>
+              <a:rPr lang="en-US" dirty="0"/>
+              <a:t>unary operator</a:t>
+            </a:r>
+          </a:p>
+        </p:txBody>
+      </p:sp>
+      <p:pic>
+        <p:nvPicPr>
+          <p:cNvPr id="4" name="Content Placeholder 3">
+            <a:extLst>
+              <a:ext uri="{FF2B5EF4-FFF2-40B4-BE49-F238E27FC236}">
+                <a16:creationId xmlns:a16="http://schemas.microsoft.com/office/drawing/2014/main" id="{D7B6B7AE-4675-2BE0-1B47-E61C0931428A}"/>
+              </a:ext>
+            </a:extLst>
+          </p:cNvPr>
+          <p:cNvPicPr>
+            <a:picLocks noGrp="1" noChangeAspect="1"/>
+          </p:cNvPicPr>
+          <p:nvPr>
+            <p:ph idx="1"/>
+          </p:nvPr>
+        </p:nvPicPr>
+        <p:blipFill>
+          <a:blip r:embed="rId2"/>
+          <a:stretch>
+            <a:fillRect/>
+          </a:stretch>
+        </p:blipFill>
+        <p:spPr>
+          <a:xfrm>
+            <a:off x="2562225" y="3308350"/>
+            <a:ext cx="7073900" cy="1676400"/>
+          </a:xfrm>
+          <a:prstGeom prst="rect">
+            <a:avLst/>
+          </a:prstGeom>
+        </p:spPr>
+      </p:pic>
+    </p:spTree>
+    <p:extLst>
+      <p:ext uri="{BB962C8B-B14F-4D97-AF65-F5344CB8AC3E}">
+        <p14:creationId xmlns:p14="http://schemas.microsoft.com/office/powerpoint/2010/main" val="157519819"/>
       </p:ext>
     </p:extLst>
   </p:cSld>
@@ -23889,6 +24645,1264 @@
     <p:extLst>
       <p:ext uri="{BB962C8B-B14F-4D97-AF65-F5344CB8AC3E}">
         <p14:creationId xmlns:p14="http://schemas.microsoft.com/office/powerpoint/2010/main" val="2644603880"/>
+      </p:ext>
+    </p:extLst>
+  </p:cSld>
+  <p:clrMapOvr>
+    <a:masterClrMapping/>
+  </p:clrMapOvr>
+  <p:transition spd="slow">
+    <p:push dir="u"/>
+  </p:transition>
+</p:sld>
+</file>
+
+<file path=ppt/slides/slide60.xml><?xml version="1.0" encoding="utf-8"?>
+<p:sld xmlns:a="http://schemas.openxmlformats.org/drawingml/2006/main" xmlns:r="http://schemas.openxmlformats.org/officeDocument/2006/relationships" xmlns:p="http://schemas.openxmlformats.org/presentationml/2006/main">
+  <p:cSld>
+    <p:spTree>
+      <p:nvGrpSpPr>
+        <p:cNvPr id="1" name=""/>
+        <p:cNvGrpSpPr/>
+        <p:nvPr/>
+      </p:nvGrpSpPr>
+      <p:grpSpPr>
+        <a:xfrm>
+          <a:off x="0" y="0"/>
+          <a:ext cx="0" cy="0"/>
+          <a:chOff x="0" y="0"/>
+          <a:chExt cx="0" cy="0"/>
+        </a:xfrm>
+      </p:grpSpPr>
+      <p:sp>
+        <p:nvSpPr>
+          <p:cNvPr id="2" name="Title 1">
+            <a:extLst>
+              <a:ext uri="{FF2B5EF4-FFF2-40B4-BE49-F238E27FC236}">
+                <a16:creationId xmlns:a16="http://schemas.microsoft.com/office/drawing/2014/main" id="{0C2C0054-5DE9-F7FA-CB23-EED6C876E594}"/>
+              </a:ext>
+            </a:extLst>
+          </p:cNvPr>
+          <p:cNvSpPr>
+            <a:spLocks noGrp="1"/>
+          </p:cNvSpPr>
+          <p:nvPr>
+            <p:ph type="title"/>
+          </p:nvPr>
+        </p:nvSpPr>
+        <p:spPr/>
+        <p:txBody>
+          <a:bodyPr/>
+          <a:lstStyle/>
+          <a:p>
+            <a:r>
+              <a:rPr lang="en-US" dirty="0"/>
+              <a:t>Binary operator</a:t>
+            </a:r>
+          </a:p>
+        </p:txBody>
+      </p:sp>
+      <p:sp>
+        <p:nvSpPr>
+          <p:cNvPr id="3" name="Content Placeholder 2">
+            <a:extLst>
+              <a:ext uri="{FF2B5EF4-FFF2-40B4-BE49-F238E27FC236}">
+                <a16:creationId xmlns:a16="http://schemas.microsoft.com/office/drawing/2014/main" id="{205A3571-3AD1-7AC4-C816-D34BA75F2010}"/>
+              </a:ext>
+            </a:extLst>
+          </p:cNvPr>
+          <p:cNvSpPr>
+            <a:spLocks noGrp="1"/>
+          </p:cNvSpPr>
+          <p:nvPr>
+            <p:ph idx="1"/>
+          </p:nvPr>
+        </p:nvSpPr>
+        <p:spPr/>
+        <p:txBody>
+          <a:bodyPr>
+            <a:normAutofit fontScale="85000" lnSpcReduction="10000"/>
+          </a:bodyPr>
+          <a:lstStyle/>
+          <a:p>
+            <a:r>
+              <a:rPr lang="en-US" dirty="0"/>
+              <a:t>Applies for 2 operands</a:t>
+            </a:r>
+          </a:p>
+          <a:p>
+            <a:r>
+              <a:rPr lang="en-US" dirty="0"/>
+              <a:t>Arithmentic operator:</a:t>
+            </a:r>
+          </a:p>
+          <a:p>
+            <a:r>
+              <a:rPr lang="en-US" dirty="0"/>
+              <a:t>+,-,*,%,/</a:t>
+            </a:r>
+          </a:p>
+          <a:p>
+            <a:r>
+              <a:rPr lang="en-US" dirty="0"/>
+              <a:t>Relational operator:</a:t>
+            </a:r>
+          </a:p>
+          <a:p>
+            <a:r>
+              <a:rPr lang="en-US" dirty="0"/>
+              <a:t>&gt;,&lt;,&gt;=,&lt;=,==,!=</a:t>
+            </a:r>
+          </a:p>
+          <a:p>
+            <a:r>
+              <a:rPr lang="en-US" dirty="0"/>
+              <a:t>Logical operators: between 2 </a:t>
+            </a:r>
+            <a:r>
+              <a:rPr lang="en-US" dirty="0" err="1"/>
+              <a:t>comparisions</a:t>
+            </a:r>
+            <a:endParaRPr lang="en-US" dirty="0"/>
+          </a:p>
+          <a:p>
+            <a:r>
+              <a:rPr lang="en-US" dirty="0"/>
+              <a:t>&amp;&amp;(and operator), ||(or operator),!</a:t>
+            </a:r>
+          </a:p>
+          <a:p>
+            <a:r>
+              <a:rPr lang="en-US" dirty="0"/>
+              <a:t>Bitwise operator</a:t>
+            </a:r>
+          </a:p>
+          <a:p>
+            <a:r>
+              <a:rPr lang="en-US" dirty="0"/>
+              <a:t>&amp; and,|or,^</a:t>
+            </a:r>
+            <a:r>
+              <a:rPr lang="en-US" dirty="0" err="1"/>
+              <a:t>xor</a:t>
+            </a:r>
+            <a:r>
+              <a:rPr lang="en-US" dirty="0"/>
+              <a:t>,~ complement,&gt;&gt;bitwise right shift,&lt;&lt;bitwise left shift,&gt;&gt;&gt; unary right shift</a:t>
+            </a:r>
+          </a:p>
+          <a:p>
+            <a:r>
+              <a:rPr lang="en-US" dirty="0"/>
+              <a:t>Assignment operator</a:t>
+            </a:r>
+          </a:p>
+          <a:p>
+            <a:r>
+              <a:rPr lang="en-US" dirty="0"/>
+              <a:t>=,+=,-=,%=,/=,&gt;&gt;=,&lt;&lt;=</a:t>
+            </a:r>
+          </a:p>
+        </p:txBody>
+      </p:sp>
+    </p:spTree>
+    <p:extLst>
+      <p:ext uri="{BB962C8B-B14F-4D97-AF65-F5344CB8AC3E}">
+        <p14:creationId xmlns:p14="http://schemas.microsoft.com/office/powerpoint/2010/main" val="1447409008"/>
+      </p:ext>
+    </p:extLst>
+  </p:cSld>
+  <p:clrMapOvr>
+    <a:masterClrMapping/>
+  </p:clrMapOvr>
+  <p:transition spd="slow">
+    <p:push dir="u"/>
+  </p:transition>
+</p:sld>
+</file>
+
+<file path=ppt/slides/slide61.xml><?xml version="1.0" encoding="utf-8"?>
+<p:sld xmlns:a="http://schemas.openxmlformats.org/drawingml/2006/main" xmlns:r="http://schemas.openxmlformats.org/officeDocument/2006/relationships" xmlns:p="http://schemas.openxmlformats.org/presentationml/2006/main">
+  <p:cSld>
+    <p:spTree>
+      <p:nvGrpSpPr>
+        <p:cNvPr id="1" name=""/>
+        <p:cNvGrpSpPr/>
+        <p:nvPr/>
+      </p:nvGrpSpPr>
+      <p:grpSpPr>
+        <a:xfrm>
+          <a:off x="0" y="0"/>
+          <a:ext cx="0" cy="0"/>
+          <a:chOff x="0" y="0"/>
+          <a:chExt cx="0" cy="0"/>
+        </a:xfrm>
+      </p:grpSpPr>
+      <p:sp>
+        <p:nvSpPr>
+          <p:cNvPr id="2" name="Title 1">
+            <a:extLst>
+              <a:ext uri="{FF2B5EF4-FFF2-40B4-BE49-F238E27FC236}">
+                <a16:creationId xmlns:a16="http://schemas.microsoft.com/office/drawing/2014/main" id="{F8D57F20-9666-BDCB-0C51-DF68492F1D2C}"/>
+              </a:ext>
+            </a:extLst>
+          </p:cNvPr>
+          <p:cNvSpPr>
+            <a:spLocks noGrp="1"/>
+          </p:cNvSpPr>
+          <p:nvPr>
+            <p:ph type="title"/>
+          </p:nvPr>
+        </p:nvSpPr>
+        <p:spPr/>
+        <p:txBody>
+          <a:bodyPr/>
+          <a:lstStyle/>
+          <a:p>
+            <a:r>
+              <a:rPr lang="en-US" dirty="0"/>
+              <a:t>Ternary operator</a:t>
+            </a:r>
+          </a:p>
+        </p:txBody>
+      </p:sp>
+      <p:sp>
+        <p:nvSpPr>
+          <p:cNvPr id="3" name="Content Placeholder 2">
+            <a:extLst>
+              <a:ext uri="{FF2B5EF4-FFF2-40B4-BE49-F238E27FC236}">
+                <a16:creationId xmlns:a16="http://schemas.microsoft.com/office/drawing/2014/main" id="{8E7E0E6A-86D1-DE21-37E3-C87798B3AAF8}"/>
+              </a:ext>
+            </a:extLst>
+          </p:cNvPr>
+          <p:cNvSpPr>
+            <a:spLocks noGrp="1"/>
+          </p:cNvSpPr>
+          <p:nvPr>
+            <p:ph idx="1"/>
+          </p:nvPr>
+        </p:nvSpPr>
+        <p:spPr/>
+        <p:txBody>
+          <a:bodyPr/>
+          <a:lstStyle/>
+          <a:p>
+            <a:r>
+              <a:rPr lang="en-US" dirty="0"/>
+              <a:t>Known as conditional operator /decision making operator</a:t>
+            </a:r>
+          </a:p>
+          <a:p>
+            <a:r>
+              <a:rPr lang="en-US" dirty="0"/>
+              <a:t>Expression ?expression 2: expression 3</a:t>
+            </a:r>
+          </a:p>
+          <a:p>
+            <a:r>
+              <a:rPr lang="en-US" dirty="0" err="1"/>
+              <a:t>Comparision?true</a:t>
+            </a:r>
+            <a:r>
+              <a:rPr lang="en-US" dirty="0"/>
+              <a:t> </a:t>
+            </a:r>
+            <a:r>
+              <a:rPr lang="en-US" dirty="0" err="1"/>
+              <a:t>statement:false</a:t>
+            </a:r>
+            <a:r>
+              <a:rPr lang="en-US" dirty="0"/>
+              <a:t> statement</a:t>
+            </a:r>
+          </a:p>
+          <a:p>
+            <a:r>
+              <a:rPr lang="en-US" dirty="0"/>
+              <a:t>For simple if-else statement recommended to go for </a:t>
+            </a:r>
+            <a:r>
+              <a:rPr lang="en-US"/>
+              <a:t>ternary operator</a:t>
+            </a:r>
+          </a:p>
+        </p:txBody>
+      </p:sp>
+    </p:spTree>
+    <p:extLst>
+      <p:ext uri="{BB962C8B-B14F-4D97-AF65-F5344CB8AC3E}">
+        <p14:creationId xmlns:p14="http://schemas.microsoft.com/office/powerpoint/2010/main" val="223900517"/>
+      </p:ext>
+    </p:extLst>
+  </p:cSld>
+  <p:clrMapOvr>
+    <a:masterClrMapping/>
+  </p:clrMapOvr>
+  <p:transition spd="slow">
+    <p:push dir="u"/>
+  </p:transition>
+</p:sld>
+</file>
+
+<file path=ppt/slides/slide62.xml><?xml version="1.0" encoding="utf-8"?>
+<p:sld xmlns:a="http://schemas.openxmlformats.org/drawingml/2006/main" xmlns:r="http://schemas.openxmlformats.org/officeDocument/2006/relationships" xmlns:p="http://schemas.openxmlformats.org/presentationml/2006/main">
+  <p:cSld>
+    <p:spTree>
+      <p:nvGrpSpPr>
+        <p:cNvPr id="1" name=""/>
+        <p:cNvGrpSpPr/>
+        <p:nvPr/>
+      </p:nvGrpSpPr>
+      <p:grpSpPr>
+        <a:xfrm>
+          <a:off x="0" y="0"/>
+          <a:ext cx="0" cy="0"/>
+          <a:chOff x="0" y="0"/>
+          <a:chExt cx="0" cy="0"/>
+        </a:xfrm>
+      </p:grpSpPr>
+      <p:sp>
+        <p:nvSpPr>
+          <p:cNvPr id="2" name="Title 1">
+            <a:extLst>
+              <a:ext uri="{FF2B5EF4-FFF2-40B4-BE49-F238E27FC236}">
+                <a16:creationId xmlns:a16="http://schemas.microsoft.com/office/drawing/2014/main" id="{9F2857BD-193F-86CA-5BAB-E64E2C0DB8BE}"/>
+              </a:ext>
+            </a:extLst>
+          </p:cNvPr>
+          <p:cNvSpPr>
+            <a:spLocks noGrp="1"/>
+          </p:cNvSpPr>
+          <p:nvPr>
+            <p:ph type="title"/>
+          </p:nvPr>
+        </p:nvSpPr>
+        <p:spPr/>
+        <p:txBody>
+          <a:bodyPr/>
+          <a:lstStyle/>
+          <a:p>
+            <a:r>
+              <a:rPr lang="en-US" dirty="0"/>
+              <a:t>Control flow statements</a:t>
+            </a:r>
+          </a:p>
+        </p:txBody>
+      </p:sp>
+      <p:sp>
+        <p:nvSpPr>
+          <p:cNvPr id="3" name="Content Placeholder 2">
+            <a:extLst>
+              <a:ext uri="{FF2B5EF4-FFF2-40B4-BE49-F238E27FC236}">
+                <a16:creationId xmlns:a16="http://schemas.microsoft.com/office/drawing/2014/main" id="{8EA94507-0132-CCAE-8590-B4F97FA8D5AF}"/>
+              </a:ext>
+            </a:extLst>
+          </p:cNvPr>
+          <p:cNvSpPr>
+            <a:spLocks noGrp="1"/>
+          </p:cNvSpPr>
+          <p:nvPr>
+            <p:ph idx="1"/>
+          </p:nvPr>
+        </p:nvSpPr>
+        <p:spPr/>
+        <p:txBody>
+          <a:bodyPr/>
+          <a:lstStyle/>
+          <a:p>
+            <a:r>
+              <a:rPr lang="en-US" dirty="0"/>
+              <a:t>Decision making statements: if </a:t>
+            </a:r>
+            <a:r>
+              <a:rPr lang="en-US" dirty="0" err="1"/>
+              <a:t>else,switch</a:t>
+            </a:r>
+            <a:endParaRPr lang="en-US" dirty="0"/>
+          </a:p>
+          <a:p>
+            <a:r>
+              <a:rPr lang="en-US" dirty="0"/>
+              <a:t>Iterative : for </a:t>
+            </a:r>
+            <a:r>
+              <a:rPr lang="en-US" dirty="0" err="1"/>
+              <a:t>loop,while</a:t>
+            </a:r>
+            <a:r>
+              <a:rPr lang="en-US" dirty="0"/>
+              <a:t> loop, do </a:t>
+            </a:r>
+            <a:r>
+              <a:rPr lang="en-US" dirty="0" err="1"/>
+              <a:t>while,for</a:t>
+            </a:r>
+            <a:r>
+              <a:rPr lang="en-US" dirty="0"/>
+              <a:t> each or enhanced for loop</a:t>
+            </a:r>
+          </a:p>
+          <a:p>
+            <a:r>
+              <a:rPr lang="en-US" dirty="0"/>
+              <a:t>Jump/transfer: </a:t>
+            </a:r>
+            <a:r>
+              <a:rPr lang="en-US" dirty="0" err="1"/>
+              <a:t>break,continue,return</a:t>
+            </a:r>
+            <a:r>
+              <a:rPr lang="en-US" dirty="0"/>
+              <a:t>.</a:t>
+            </a:r>
+          </a:p>
+        </p:txBody>
+      </p:sp>
+    </p:spTree>
+    <p:extLst>
+      <p:ext uri="{BB962C8B-B14F-4D97-AF65-F5344CB8AC3E}">
+        <p14:creationId xmlns:p14="http://schemas.microsoft.com/office/powerpoint/2010/main" val="2104110480"/>
+      </p:ext>
+    </p:extLst>
+  </p:cSld>
+  <p:clrMapOvr>
+    <a:masterClrMapping/>
+  </p:clrMapOvr>
+  <p:transition spd="slow">
+    <p:push dir="u"/>
+  </p:transition>
+</p:sld>
+</file>
+
+<file path=ppt/slides/slide63.xml><?xml version="1.0" encoding="utf-8"?>
+<p:sld xmlns:a="http://schemas.openxmlformats.org/drawingml/2006/main" xmlns:r="http://schemas.openxmlformats.org/officeDocument/2006/relationships" xmlns:p="http://schemas.openxmlformats.org/presentationml/2006/main">
+  <p:cSld>
+    <p:spTree>
+      <p:nvGrpSpPr>
+        <p:cNvPr id="1" name=""/>
+        <p:cNvGrpSpPr/>
+        <p:nvPr/>
+      </p:nvGrpSpPr>
+      <p:grpSpPr>
+        <a:xfrm>
+          <a:off x="0" y="0"/>
+          <a:ext cx="0" cy="0"/>
+          <a:chOff x="0" y="0"/>
+          <a:chExt cx="0" cy="0"/>
+        </a:xfrm>
+      </p:grpSpPr>
+      <p:sp>
+        <p:nvSpPr>
+          <p:cNvPr id="2" name="Title 1">
+            <a:extLst>
+              <a:ext uri="{FF2B5EF4-FFF2-40B4-BE49-F238E27FC236}">
+                <a16:creationId xmlns:a16="http://schemas.microsoft.com/office/drawing/2014/main" id="{AA045507-0FD9-CB39-C0C4-B7A54DE72D2E}"/>
+              </a:ext>
+            </a:extLst>
+          </p:cNvPr>
+          <p:cNvSpPr>
+            <a:spLocks noGrp="1"/>
+          </p:cNvSpPr>
+          <p:nvPr>
+            <p:ph type="title"/>
+          </p:nvPr>
+        </p:nvSpPr>
+        <p:spPr/>
+        <p:txBody>
+          <a:bodyPr/>
+          <a:lstStyle/>
+          <a:p>
+            <a:r>
+              <a:rPr lang="en-US" dirty="0"/>
+              <a:t>If else</a:t>
+            </a:r>
+          </a:p>
+        </p:txBody>
+      </p:sp>
+      <p:sp>
+        <p:nvSpPr>
+          <p:cNvPr id="3" name="Content Placeholder 2">
+            <a:extLst>
+              <a:ext uri="{FF2B5EF4-FFF2-40B4-BE49-F238E27FC236}">
+                <a16:creationId xmlns:a16="http://schemas.microsoft.com/office/drawing/2014/main" id="{CAD6D29C-42C4-B5AB-6D39-D5D8FB2EDD77}"/>
+              </a:ext>
+            </a:extLst>
+          </p:cNvPr>
+          <p:cNvSpPr>
+            <a:spLocks noGrp="1"/>
+          </p:cNvSpPr>
+          <p:nvPr>
+            <p:ph idx="1"/>
+          </p:nvPr>
+        </p:nvSpPr>
+        <p:spPr>
+          <a:ln>
+            <a:solidFill>
+              <a:schemeClr val="accent1"/>
+            </a:solidFill>
+          </a:ln>
+        </p:spPr>
+        <p:txBody>
+          <a:bodyPr>
+            <a:normAutofit lnSpcReduction="10000"/>
+          </a:bodyPr>
+          <a:lstStyle/>
+          <a:p>
+            <a:r>
+              <a:rPr lang="en-US" dirty="0"/>
+              <a:t>Syntax:</a:t>
+            </a:r>
+          </a:p>
+          <a:p>
+            <a:pPr marL="0" indent="0">
+              <a:buNone/>
+            </a:pPr>
+            <a:r>
+              <a:rPr lang="en-US" dirty="0"/>
+              <a:t>1. If(condition) </a:t>
+            </a:r>
+          </a:p>
+          <a:p>
+            <a:pPr marL="0" indent="0">
+              <a:buNone/>
+            </a:pPr>
+            <a:r>
+              <a:rPr lang="en-US" dirty="0"/>
+              <a:t>//condition always give true or false(Boolean)</a:t>
+            </a:r>
+          </a:p>
+          <a:p>
+            <a:pPr marL="0" indent="0">
+              <a:buNone/>
+            </a:pPr>
+            <a:r>
+              <a:rPr lang="en-US" dirty="0"/>
+              <a:t>{//statements</a:t>
+            </a:r>
+          </a:p>
+          <a:p>
+            <a:pPr marL="0" indent="0">
+              <a:buNone/>
+            </a:pPr>
+            <a:r>
+              <a:rPr lang="en-US" dirty="0"/>
+              <a:t>}</a:t>
+            </a:r>
+          </a:p>
+          <a:p>
+            <a:pPr marL="0" indent="0">
+              <a:buNone/>
+            </a:pPr>
+            <a:r>
+              <a:rPr lang="en-US" dirty="0"/>
+              <a:t>Else</a:t>
+            </a:r>
+          </a:p>
+          <a:p>
+            <a:pPr marL="0" indent="0">
+              <a:buNone/>
+            </a:pPr>
+            <a:r>
+              <a:rPr lang="en-US" dirty="0"/>
+              <a:t>{ statement</a:t>
+            </a:r>
+          </a:p>
+          <a:p>
+            <a:pPr marL="0" indent="0">
+              <a:buNone/>
+            </a:pPr>
+            <a:r>
+              <a:rPr lang="en-US" dirty="0"/>
+              <a:t>}</a:t>
+            </a:r>
+          </a:p>
+          <a:p>
+            <a:pPr marL="0" indent="0">
+              <a:buNone/>
+            </a:pPr>
+            <a:r>
+              <a:rPr lang="en-US" dirty="0"/>
+              <a:t>2. If-elseif-else </a:t>
+            </a:r>
+          </a:p>
+          <a:p>
+            <a:pPr marL="0" indent="0">
+              <a:buNone/>
+            </a:pPr>
+            <a:r>
+              <a:rPr lang="en-US" dirty="0">
+                <a:solidFill>
+                  <a:srgbClr val="FF0000"/>
+                </a:solidFill>
+              </a:rPr>
+              <a:t>Only Declaration inside if else condition is not allowed.</a:t>
+            </a:r>
+          </a:p>
+        </p:txBody>
+      </p:sp>
+      <p:pic>
+        <p:nvPicPr>
+          <p:cNvPr id="4" name="Picture 3">
+            <a:extLst>
+              <a:ext uri="{FF2B5EF4-FFF2-40B4-BE49-F238E27FC236}">
+                <a16:creationId xmlns:a16="http://schemas.microsoft.com/office/drawing/2014/main" id="{6B14C2FC-5947-6085-18C6-D0D5978E4283}"/>
+              </a:ext>
+            </a:extLst>
+          </p:cNvPr>
+          <p:cNvPicPr>
+            <a:picLocks noChangeAspect="1"/>
+          </p:cNvPicPr>
+          <p:nvPr/>
+        </p:nvPicPr>
+        <p:blipFill>
+          <a:blip r:embed="rId2"/>
+          <a:stretch>
+            <a:fillRect/>
+          </a:stretch>
+        </p:blipFill>
+        <p:spPr>
+          <a:xfrm>
+            <a:off x="4494599" y="3279002"/>
+            <a:ext cx="5575300" cy="1955800"/>
+          </a:xfrm>
+          <a:prstGeom prst="rect">
+            <a:avLst/>
+          </a:prstGeom>
+          <a:ln>
+            <a:solidFill>
+              <a:schemeClr val="accent1"/>
+            </a:solidFill>
+          </a:ln>
+        </p:spPr>
+      </p:pic>
+      <p:pic>
+        <p:nvPicPr>
+          <p:cNvPr id="6" name="Picture 5" descr="A screenshot of a computer code&#10;&#10;AI-generated content may be incorrect.">
+            <a:extLst>
+              <a:ext uri="{FF2B5EF4-FFF2-40B4-BE49-F238E27FC236}">
+                <a16:creationId xmlns:a16="http://schemas.microsoft.com/office/drawing/2014/main" id="{BB29E71B-CC65-19A2-3A2E-86D29DE92BF0}"/>
+              </a:ext>
+            </a:extLst>
+          </p:cNvPr>
+          <p:cNvPicPr>
+            <a:picLocks noChangeAspect="1"/>
+          </p:cNvPicPr>
+          <p:nvPr/>
+        </p:nvPicPr>
+        <p:blipFill>
+          <a:blip r:embed="rId3"/>
+          <a:stretch>
+            <a:fillRect/>
+          </a:stretch>
+        </p:blipFill>
+        <p:spPr>
+          <a:xfrm>
+            <a:off x="4870107" y="334148"/>
+            <a:ext cx="5854700" cy="2578100"/>
+          </a:xfrm>
+          <a:prstGeom prst="rect">
+            <a:avLst/>
+          </a:prstGeom>
+          <a:ln>
+            <a:solidFill>
+              <a:schemeClr val="accent1"/>
+            </a:solidFill>
+          </a:ln>
+        </p:spPr>
+      </p:pic>
+    </p:spTree>
+    <p:extLst>
+      <p:ext uri="{BB962C8B-B14F-4D97-AF65-F5344CB8AC3E}">
+        <p14:creationId xmlns:p14="http://schemas.microsoft.com/office/powerpoint/2010/main" val="557125002"/>
+      </p:ext>
+    </p:extLst>
+  </p:cSld>
+  <p:clrMapOvr>
+    <a:masterClrMapping/>
+  </p:clrMapOvr>
+  <p:transition spd="slow">
+    <p:push dir="u"/>
+  </p:transition>
+</p:sld>
+</file>
+
+<file path=ppt/slides/slide64.xml><?xml version="1.0" encoding="utf-8"?>
+<p:sld xmlns:a="http://schemas.openxmlformats.org/drawingml/2006/main" xmlns:r="http://schemas.openxmlformats.org/officeDocument/2006/relationships" xmlns:p="http://schemas.openxmlformats.org/presentationml/2006/main">
+  <p:cSld>
+    <p:spTree>
+      <p:nvGrpSpPr>
+        <p:cNvPr id="1" name=""/>
+        <p:cNvGrpSpPr/>
+        <p:nvPr/>
+      </p:nvGrpSpPr>
+      <p:grpSpPr>
+        <a:xfrm>
+          <a:off x="0" y="0"/>
+          <a:ext cx="0" cy="0"/>
+          <a:chOff x="0" y="0"/>
+          <a:chExt cx="0" cy="0"/>
+        </a:xfrm>
+      </p:grpSpPr>
+      <p:sp>
+        <p:nvSpPr>
+          <p:cNvPr id="2" name="Title 1">
+            <a:extLst>
+              <a:ext uri="{FF2B5EF4-FFF2-40B4-BE49-F238E27FC236}">
+                <a16:creationId xmlns:a16="http://schemas.microsoft.com/office/drawing/2014/main" id="{32DCA56A-180D-32BF-E98B-43936428ABFE}"/>
+              </a:ext>
+            </a:extLst>
+          </p:cNvPr>
+          <p:cNvSpPr>
+            <a:spLocks noGrp="1"/>
+          </p:cNvSpPr>
+          <p:nvPr>
+            <p:ph type="title"/>
+          </p:nvPr>
+        </p:nvSpPr>
+        <p:spPr/>
+        <p:txBody>
+          <a:bodyPr/>
+          <a:lstStyle/>
+          <a:p>
+            <a:r>
+              <a:rPr lang="en-US" dirty="0"/>
+              <a:t>Switch case</a:t>
+            </a:r>
+          </a:p>
+        </p:txBody>
+      </p:sp>
+      <p:pic>
+        <p:nvPicPr>
+          <p:cNvPr id="4" name="Content Placeholder 3">
+            <a:extLst>
+              <a:ext uri="{FF2B5EF4-FFF2-40B4-BE49-F238E27FC236}">
+                <a16:creationId xmlns:a16="http://schemas.microsoft.com/office/drawing/2014/main" id="{ACDB3BF7-12E6-9D0D-EDDF-9FC6C5750548}"/>
+              </a:ext>
+            </a:extLst>
+          </p:cNvPr>
+          <p:cNvPicPr>
+            <a:picLocks noGrp="1" noChangeAspect="1"/>
+          </p:cNvPicPr>
+          <p:nvPr>
+            <p:ph idx="1"/>
+          </p:nvPr>
+        </p:nvPicPr>
+        <p:blipFill>
+          <a:blip r:embed="rId2"/>
+          <a:stretch>
+            <a:fillRect/>
+          </a:stretch>
+        </p:blipFill>
+        <p:spPr>
+          <a:xfrm>
+            <a:off x="3311525" y="3168650"/>
+            <a:ext cx="5575300" cy="1955800"/>
+          </a:xfrm>
+          <a:prstGeom prst="rect">
+            <a:avLst/>
+          </a:prstGeom>
+          <a:ln>
+            <a:solidFill>
+              <a:schemeClr val="accent1"/>
+            </a:solidFill>
+          </a:ln>
+        </p:spPr>
+      </p:pic>
+      <p:sp>
+        <p:nvSpPr>
+          <p:cNvPr id="5" name="TextBox 4">
+            <a:extLst>
+              <a:ext uri="{FF2B5EF4-FFF2-40B4-BE49-F238E27FC236}">
+                <a16:creationId xmlns:a16="http://schemas.microsoft.com/office/drawing/2014/main" id="{72BBCFA2-FBBB-F3DC-9D04-4B24D3CA4F7E}"/>
+              </a:ext>
+            </a:extLst>
+          </p:cNvPr>
+          <p:cNvSpPr txBox="1"/>
+          <p:nvPr/>
+        </p:nvSpPr>
+        <p:spPr>
+          <a:xfrm>
+            <a:off x="1235764" y="1989438"/>
+            <a:ext cx="9886388" cy="1200329"/>
+          </a:xfrm>
+          <a:prstGeom prst="rect">
+            <a:avLst/>
+          </a:prstGeom>
+          <a:noFill/>
+        </p:spPr>
+        <p:txBody>
+          <a:bodyPr wrap="square" rtlCol="0">
+            <a:spAutoFit/>
+          </a:bodyPr>
+          <a:lstStyle/>
+          <a:p>
+            <a:r>
+              <a:rPr lang="en-US" dirty="0"/>
+              <a:t>Switch (</a:t>
+            </a:r>
+            <a:r>
+              <a:rPr lang="en-US" b="1" dirty="0"/>
+              <a:t>key</a:t>
+            </a:r>
+            <a:r>
+              <a:rPr lang="en-US" dirty="0"/>
+              <a:t>){</a:t>
+            </a:r>
+          </a:p>
+          <a:p>
+            <a:r>
+              <a:rPr lang="en-US" dirty="0"/>
+              <a:t>Case </a:t>
+            </a:r>
+            <a:r>
+              <a:rPr lang="en-US" b="1" dirty="0"/>
+              <a:t>value</a:t>
+            </a:r>
+            <a:r>
+              <a:rPr lang="en-US" dirty="0"/>
+              <a:t>: body or statement;</a:t>
+            </a:r>
+          </a:p>
+          <a:p>
+            <a:r>
+              <a:rPr lang="en-US" dirty="0"/>
+              <a:t>Break;</a:t>
+            </a:r>
+          </a:p>
+          <a:p>
+            <a:r>
+              <a:rPr lang="en-US" dirty="0"/>
+              <a:t>default: body</a:t>
+            </a:r>
+          </a:p>
+        </p:txBody>
+      </p:sp>
+    </p:spTree>
+    <p:extLst>
+      <p:ext uri="{BB962C8B-B14F-4D97-AF65-F5344CB8AC3E}">
+        <p14:creationId xmlns:p14="http://schemas.microsoft.com/office/powerpoint/2010/main" val="3850820059"/>
+      </p:ext>
+    </p:extLst>
+  </p:cSld>
+  <p:clrMapOvr>
+    <a:masterClrMapping/>
+  </p:clrMapOvr>
+  <p:transition spd="slow">
+    <p:push dir="u"/>
+  </p:transition>
+</p:sld>
+</file>
+
+<file path=ppt/slides/slide65.xml><?xml version="1.0" encoding="utf-8"?>
+<p:sld xmlns:a="http://schemas.openxmlformats.org/drawingml/2006/main" xmlns:r="http://schemas.openxmlformats.org/officeDocument/2006/relationships" xmlns:p="http://schemas.openxmlformats.org/presentationml/2006/main">
+  <p:cSld>
+    <p:spTree>
+      <p:nvGrpSpPr>
+        <p:cNvPr id="1" name=""/>
+        <p:cNvGrpSpPr/>
+        <p:nvPr/>
+      </p:nvGrpSpPr>
+      <p:grpSpPr>
+        <a:xfrm>
+          <a:off x="0" y="0"/>
+          <a:ext cx="0" cy="0"/>
+          <a:chOff x="0" y="0"/>
+          <a:chExt cx="0" cy="0"/>
+        </a:xfrm>
+      </p:grpSpPr>
+      <p:sp>
+        <p:nvSpPr>
+          <p:cNvPr id="2" name="Title 1">
+            <a:extLst>
+              <a:ext uri="{FF2B5EF4-FFF2-40B4-BE49-F238E27FC236}">
+                <a16:creationId xmlns:a16="http://schemas.microsoft.com/office/drawing/2014/main" id="{258C8F4B-505E-DF5C-764A-2263FB2167CE}"/>
+              </a:ext>
+            </a:extLst>
+          </p:cNvPr>
+          <p:cNvSpPr>
+            <a:spLocks noGrp="1"/>
+          </p:cNvSpPr>
+          <p:nvPr>
+            <p:ph type="title"/>
+          </p:nvPr>
+        </p:nvSpPr>
+        <p:spPr/>
+        <p:txBody>
+          <a:bodyPr/>
+          <a:lstStyle/>
+          <a:p>
+            <a:r>
+              <a:rPr lang="en-US" dirty="0"/>
+              <a:t>For loop</a:t>
+            </a:r>
+          </a:p>
+        </p:txBody>
+      </p:sp>
+      <p:sp>
+        <p:nvSpPr>
+          <p:cNvPr id="3" name="Content Placeholder 2">
+            <a:extLst>
+              <a:ext uri="{FF2B5EF4-FFF2-40B4-BE49-F238E27FC236}">
+                <a16:creationId xmlns:a16="http://schemas.microsoft.com/office/drawing/2014/main" id="{B3BB51B4-DF4E-F1CB-F0FE-C60D97D6E90C}"/>
+              </a:ext>
+            </a:extLst>
+          </p:cNvPr>
+          <p:cNvSpPr>
+            <a:spLocks noGrp="1"/>
+          </p:cNvSpPr>
+          <p:nvPr>
+            <p:ph idx="1"/>
+          </p:nvPr>
+        </p:nvSpPr>
+        <p:spPr/>
+        <p:txBody>
+          <a:bodyPr/>
+          <a:lstStyle/>
+          <a:p>
+            <a:pPr marL="0" indent="0">
+              <a:buNone/>
+            </a:pPr>
+            <a:r>
+              <a:rPr lang="en-US" dirty="0"/>
+              <a:t>For(initialization; condition check; increment)</a:t>
+            </a:r>
+          </a:p>
+          <a:p>
+            <a:pPr marL="0" indent="0">
+              <a:buNone/>
+            </a:pPr>
+            <a:r>
+              <a:rPr lang="en-US" dirty="0"/>
+              <a:t>{statement</a:t>
+            </a:r>
+          </a:p>
+          <a:p>
+            <a:pPr marL="0" indent="0">
+              <a:buNone/>
+            </a:pPr>
+            <a:r>
+              <a:rPr lang="en-US" dirty="0"/>
+              <a:t>}</a:t>
+            </a:r>
+          </a:p>
+        </p:txBody>
+      </p:sp>
+      <p:pic>
+        <p:nvPicPr>
+          <p:cNvPr id="4" name="Picture 3">
+            <a:extLst>
+              <a:ext uri="{FF2B5EF4-FFF2-40B4-BE49-F238E27FC236}">
+                <a16:creationId xmlns:a16="http://schemas.microsoft.com/office/drawing/2014/main" id="{34A6C8DD-FFCD-EB2A-E300-8DC76C817F71}"/>
+              </a:ext>
+            </a:extLst>
+          </p:cNvPr>
+          <p:cNvPicPr>
+            <a:picLocks noChangeAspect="1"/>
+          </p:cNvPicPr>
+          <p:nvPr/>
+        </p:nvPicPr>
+        <p:blipFill>
+          <a:blip r:embed="rId2"/>
+          <a:stretch>
+            <a:fillRect/>
+          </a:stretch>
+        </p:blipFill>
+        <p:spPr>
+          <a:xfrm>
+            <a:off x="5876667" y="2662881"/>
+            <a:ext cx="4343400" cy="914400"/>
+          </a:xfrm>
+          <a:prstGeom prst="rect">
+            <a:avLst/>
+          </a:prstGeom>
+          <a:ln>
+            <a:solidFill>
+              <a:schemeClr val="accent1"/>
+            </a:solidFill>
+          </a:ln>
+        </p:spPr>
+      </p:pic>
+      <p:pic>
+        <p:nvPicPr>
+          <p:cNvPr id="5" name="Picture 4">
+            <a:extLst>
+              <a:ext uri="{FF2B5EF4-FFF2-40B4-BE49-F238E27FC236}">
+                <a16:creationId xmlns:a16="http://schemas.microsoft.com/office/drawing/2014/main" id="{C61C8334-F51A-43AC-A19D-FB68582D605B}"/>
+              </a:ext>
+            </a:extLst>
+          </p:cNvPr>
+          <p:cNvPicPr>
+            <a:picLocks noChangeAspect="1"/>
+          </p:cNvPicPr>
+          <p:nvPr/>
+        </p:nvPicPr>
+        <p:blipFill>
+          <a:blip r:embed="rId3"/>
+          <a:stretch>
+            <a:fillRect/>
+          </a:stretch>
+        </p:blipFill>
+        <p:spPr>
+          <a:xfrm>
+            <a:off x="5954926" y="4118754"/>
+            <a:ext cx="3644900" cy="1104900"/>
+          </a:xfrm>
+          <a:prstGeom prst="rect">
+            <a:avLst/>
+          </a:prstGeom>
+          <a:ln>
+            <a:solidFill>
+              <a:schemeClr val="accent1"/>
+            </a:solidFill>
+          </a:ln>
+        </p:spPr>
+      </p:pic>
+    </p:spTree>
+    <p:extLst>
+      <p:ext uri="{BB962C8B-B14F-4D97-AF65-F5344CB8AC3E}">
+        <p14:creationId xmlns:p14="http://schemas.microsoft.com/office/powerpoint/2010/main" val="2458646756"/>
+      </p:ext>
+    </p:extLst>
+  </p:cSld>
+  <p:clrMapOvr>
+    <a:masterClrMapping/>
+  </p:clrMapOvr>
+  <p:transition spd="slow">
+    <p:push dir="u"/>
+  </p:transition>
+</p:sld>
+</file>
+
+<file path=ppt/slides/slide66.xml><?xml version="1.0" encoding="utf-8"?>
+<p:sld xmlns:a="http://schemas.openxmlformats.org/drawingml/2006/main" xmlns:r="http://schemas.openxmlformats.org/officeDocument/2006/relationships" xmlns:p="http://schemas.openxmlformats.org/presentationml/2006/main">
+  <p:cSld>
+    <p:spTree>
+      <p:nvGrpSpPr>
+        <p:cNvPr id="1" name=""/>
+        <p:cNvGrpSpPr/>
+        <p:nvPr/>
+      </p:nvGrpSpPr>
+      <p:grpSpPr>
+        <a:xfrm>
+          <a:off x="0" y="0"/>
+          <a:ext cx="0" cy="0"/>
+          <a:chOff x="0" y="0"/>
+          <a:chExt cx="0" cy="0"/>
+        </a:xfrm>
+      </p:grpSpPr>
+      <p:sp>
+        <p:nvSpPr>
+          <p:cNvPr id="2" name="Title 1">
+            <a:extLst>
+              <a:ext uri="{FF2B5EF4-FFF2-40B4-BE49-F238E27FC236}">
+                <a16:creationId xmlns:a16="http://schemas.microsoft.com/office/drawing/2014/main" id="{96332DC2-B263-C788-439E-D3181BE1B56C}"/>
+              </a:ext>
+            </a:extLst>
+          </p:cNvPr>
+          <p:cNvSpPr>
+            <a:spLocks noGrp="1"/>
+          </p:cNvSpPr>
+          <p:nvPr>
+            <p:ph type="title"/>
+          </p:nvPr>
+        </p:nvSpPr>
+        <p:spPr/>
+        <p:txBody>
+          <a:bodyPr/>
+          <a:lstStyle/>
+          <a:p>
+            <a:r>
+              <a:rPr lang="en-US" dirty="0"/>
+              <a:t>While loop</a:t>
+            </a:r>
+          </a:p>
+        </p:txBody>
+      </p:sp>
+      <p:sp>
+        <p:nvSpPr>
+          <p:cNvPr id="3" name="Content Placeholder 2">
+            <a:extLst>
+              <a:ext uri="{FF2B5EF4-FFF2-40B4-BE49-F238E27FC236}">
+                <a16:creationId xmlns:a16="http://schemas.microsoft.com/office/drawing/2014/main" id="{786D8F39-F07F-1533-381F-FB3015104155}"/>
+              </a:ext>
+            </a:extLst>
+          </p:cNvPr>
+          <p:cNvSpPr>
+            <a:spLocks noGrp="1"/>
+          </p:cNvSpPr>
+          <p:nvPr>
+            <p:ph idx="1"/>
+          </p:nvPr>
+        </p:nvSpPr>
+        <p:spPr/>
+        <p:txBody>
+          <a:bodyPr/>
+          <a:lstStyle/>
+          <a:p>
+            <a:endParaRPr lang="en-US" dirty="0"/>
+          </a:p>
+        </p:txBody>
+      </p:sp>
+      <p:pic>
+        <p:nvPicPr>
+          <p:cNvPr id="4" name="Picture 3">
+            <a:extLst>
+              <a:ext uri="{FF2B5EF4-FFF2-40B4-BE49-F238E27FC236}">
+                <a16:creationId xmlns:a16="http://schemas.microsoft.com/office/drawing/2014/main" id="{16BFD729-91EC-C409-C083-1281F8ABA150}"/>
+              </a:ext>
+            </a:extLst>
+          </p:cNvPr>
+          <p:cNvPicPr>
+            <a:picLocks noChangeAspect="1"/>
+          </p:cNvPicPr>
+          <p:nvPr/>
+        </p:nvPicPr>
+        <p:blipFill>
+          <a:blip r:embed="rId2"/>
+          <a:stretch>
+            <a:fillRect/>
+          </a:stretch>
+        </p:blipFill>
+        <p:spPr>
+          <a:xfrm>
+            <a:off x="5552131" y="2380049"/>
+            <a:ext cx="4127500" cy="812800"/>
+          </a:xfrm>
+          <a:prstGeom prst="rect">
+            <a:avLst/>
+          </a:prstGeom>
+          <a:ln>
+            <a:solidFill>
+              <a:schemeClr val="accent1"/>
+            </a:solidFill>
+          </a:ln>
+        </p:spPr>
+      </p:pic>
+    </p:spTree>
+    <p:extLst>
+      <p:ext uri="{BB962C8B-B14F-4D97-AF65-F5344CB8AC3E}">
+        <p14:creationId xmlns:p14="http://schemas.microsoft.com/office/powerpoint/2010/main" val="653943476"/>
+      </p:ext>
+    </p:extLst>
+  </p:cSld>
+  <p:clrMapOvr>
+    <a:masterClrMapping/>
+  </p:clrMapOvr>
+  <p:transition spd="slow">
+    <p:push dir="u"/>
+  </p:transition>
+</p:sld>
+</file>
+
+<file path=ppt/slides/slide67.xml><?xml version="1.0" encoding="utf-8"?>
+<p:sld xmlns:a="http://schemas.openxmlformats.org/drawingml/2006/main" xmlns:r="http://schemas.openxmlformats.org/officeDocument/2006/relationships" xmlns:p="http://schemas.openxmlformats.org/presentationml/2006/main">
+  <p:cSld>
+    <p:spTree>
+      <p:nvGrpSpPr>
+        <p:cNvPr id="1" name=""/>
+        <p:cNvGrpSpPr/>
+        <p:nvPr/>
+      </p:nvGrpSpPr>
+      <p:grpSpPr>
+        <a:xfrm>
+          <a:off x="0" y="0"/>
+          <a:ext cx="0" cy="0"/>
+          <a:chOff x="0" y="0"/>
+          <a:chExt cx="0" cy="0"/>
+        </a:xfrm>
+      </p:grpSpPr>
+      <p:sp>
+        <p:nvSpPr>
+          <p:cNvPr id="2" name="Title 1">
+            <a:extLst>
+              <a:ext uri="{FF2B5EF4-FFF2-40B4-BE49-F238E27FC236}">
+                <a16:creationId xmlns:a16="http://schemas.microsoft.com/office/drawing/2014/main" id="{87AB2250-6813-33FE-675C-57AEECD25577}"/>
+              </a:ext>
+            </a:extLst>
+          </p:cNvPr>
+          <p:cNvSpPr>
+            <a:spLocks noGrp="1"/>
+          </p:cNvSpPr>
+          <p:nvPr>
+            <p:ph type="title"/>
+          </p:nvPr>
+        </p:nvSpPr>
+        <p:spPr/>
+        <p:txBody>
+          <a:bodyPr/>
+          <a:lstStyle/>
+          <a:p>
+            <a:r>
+              <a:rPr lang="en-US" dirty="0"/>
+              <a:t>Do while</a:t>
+            </a:r>
+          </a:p>
+        </p:txBody>
+      </p:sp>
+      <p:sp>
+        <p:nvSpPr>
+          <p:cNvPr id="3" name="Content Placeholder 2">
+            <a:extLst>
+              <a:ext uri="{FF2B5EF4-FFF2-40B4-BE49-F238E27FC236}">
+                <a16:creationId xmlns:a16="http://schemas.microsoft.com/office/drawing/2014/main" id="{266A70D5-D66A-E607-E7F0-BB360FC677EA}"/>
+              </a:ext>
+            </a:extLst>
+          </p:cNvPr>
+          <p:cNvSpPr>
+            <a:spLocks noGrp="1"/>
+          </p:cNvSpPr>
+          <p:nvPr>
+            <p:ph idx="1"/>
+          </p:nvPr>
+        </p:nvSpPr>
+        <p:spPr/>
+        <p:txBody>
+          <a:bodyPr/>
+          <a:lstStyle/>
+          <a:p>
+            <a:endParaRPr lang="en-US" dirty="0"/>
+          </a:p>
+        </p:txBody>
+      </p:sp>
+      <p:pic>
+        <p:nvPicPr>
+          <p:cNvPr id="4" name="Picture 3">
+            <a:extLst>
+              <a:ext uri="{FF2B5EF4-FFF2-40B4-BE49-F238E27FC236}">
+                <a16:creationId xmlns:a16="http://schemas.microsoft.com/office/drawing/2014/main" id="{ACE055CD-FF11-FCD2-D1BD-57D43CBAF961}"/>
+              </a:ext>
+            </a:extLst>
+          </p:cNvPr>
+          <p:cNvPicPr>
+            <a:picLocks noChangeAspect="1"/>
+          </p:cNvPicPr>
+          <p:nvPr/>
+        </p:nvPicPr>
+        <p:blipFill>
+          <a:blip r:embed="rId2"/>
+          <a:stretch>
+            <a:fillRect/>
+          </a:stretch>
+        </p:blipFill>
+        <p:spPr>
+          <a:xfrm>
+            <a:off x="4006850" y="2743200"/>
+            <a:ext cx="4178300" cy="1371600"/>
+          </a:xfrm>
+          <a:prstGeom prst="rect">
+            <a:avLst/>
+          </a:prstGeom>
+          <a:ln>
+            <a:solidFill>
+              <a:schemeClr val="accent1"/>
+            </a:solidFill>
+          </a:ln>
+        </p:spPr>
+      </p:pic>
+    </p:spTree>
+    <p:extLst>
+      <p:ext uri="{BB962C8B-B14F-4D97-AF65-F5344CB8AC3E}">
+        <p14:creationId xmlns:p14="http://schemas.microsoft.com/office/powerpoint/2010/main" val="583925176"/>
       </p:ext>
     </p:extLst>
   </p:cSld>

</xml_diff>